<commit_message>
Some latest amendments to lecture 2 and beyond. Overload samples.
git-svn-id: https://svn.code.sf.net/p/cpp-lects-rus/code/trunk@225 39143b06-f351-456c-9f92-4cd32fad6823
</commit_message>
<xml_diff>
--- a/slides/sep2017/03-typeinference.pptx
+++ b/slides/sep2017/03-typeinference.pptx
@@ -357,7 +357,7 @@
             <a:fld id="{96DFF08F-DC6B-4601-B491-B0F83F6DD2DA}" type="datetimeFigureOut">
               <a:rPr lang="en-US" dirty="0"/>
               <a:pPr/>
-              <a:t>8/15/2017</a:t>
+              <a:t>9/15/2017</a:t>
             </a:fld>
             <a:endParaRPr lang="en-US" dirty="0"/>
           </a:p>
@@ -574,7 +574,7 @@
           <a:p>
             <a:fld id="{96DFF08F-DC6B-4601-B491-B0F83F6DD2DA}" type="datetimeFigureOut">
               <a:rPr lang="en-US" dirty="0"/>
-              <a:t>8/15/2017</a:t>
+              <a:t>9/15/2017</a:t>
             </a:fld>
             <a:endParaRPr lang="en-US" dirty="0"/>
           </a:p>
@@ -749,7 +749,7 @@
           <a:p>
             <a:fld id="{96DFF08F-DC6B-4601-B491-B0F83F6DD2DA}" type="datetimeFigureOut">
               <a:rPr lang="en-US" dirty="0"/>
-              <a:t>8/15/2017</a:t>
+              <a:t>9/15/2017</a:t>
             </a:fld>
             <a:endParaRPr lang="en-US" dirty="0"/>
           </a:p>
@@ -914,7 +914,7 @@
           <a:p>
             <a:fld id="{96DFF08F-DC6B-4601-B491-B0F83F6DD2DA}" type="datetimeFigureOut">
               <a:rPr lang="en-US" dirty="0"/>
-              <a:t>8/15/2017</a:t>
+              <a:t>9/15/2017</a:t>
             </a:fld>
             <a:endParaRPr lang="en-US" dirty="0"/>
           </a:p>
@@ -1160,7 +1160,7 @@
           <a:p>
             <a:fld id="{96DFF08F-DC6B-4601-B491-B0F83F6DD2DA}" type="datetimeFigureOut">
               <a:rPr lang="en-US" dirty="0"/>
-              <a:t>8/15/2017</a:t>
+              <a:t>9/15/2017</a:t>
             </a:fld>
             <a:endParaRPr lang="en-US" dirty="0"/>
           </a:p>
@@ -1478,7 +1478,7 @@
           <a:p>
             <a:fld id="{96DFF08F-DC6B-4601-B491-B0F83F6DD2DA}" type="datetimeFigureOut">
               <a:rPr lang="en-US" dirty="0"/>
-              <a:t>8/15/2017</a:t>
+              <a:t>9/15/2017</a:t>
             </a:fld>
             <a:endParaRPr lang="en-US" dirty="0"/>
           </a:p>
@@ -1897,7 +1897,7 @@
           <a:p>
             <a:fld id="{96DFF08F-DC6B-4601-B491-B0F83F6DD2DA}" type="datetimeFigureOut">
               <a:rPr lang="en-US" dirty="0"/>
-              <a:t>8/15/2017</a:t>
+              <a:t>9/15/2017</a:t>
             </a:fld>
             <a:endParaRPr lang="en-US" dirty="0"/>
           </a:p>
@@ -2010,7 +2010,7 @@
           <a:p>
             <a:fld id="{96DFF08F-DC6B-4601-B491-B0F83F6DD2DA}" type="datetimeFigureOut">
               <a:rPr lang="en-US" dirty="0"/>
-              <a:t>8/15/2017</a:t>
+              <a:t>9/15/2017</a:t>
             </a:fld>
             <a:endParaRPr lang="en-US" dirty="0"/>
           </a:p>
@@ -2100,7 +2100,7 @@
           <a:p>
             <a:fld id="{96DFF08F-DC6B-4601-B491-B0F83F6DD2DA}" type="datetimeFigureOut">
               <a:rPr lang="en-US" dirty="0"/>
-              <a:t>8/15/2017</a:t>
+              <a:t>9/15/2017</a:t>
             </a:fld>
             <a:endParaRPr lang="en-US" dirty="0"/>
           </a:p>
@@ -2385,7 +2385,7 @@
           <a:p>
             <a:fld id="{96DFF08F-DC6B-4601-B491-B0F83F6DD2DA}" type="datetimeFigureOut">
               <a:rPr lang="en-US" dirty="0"/>
-              <a:t>8/15/2017</a:t>
+              <a:t>9/15/2017</a:t>
             </a:fld>
             <a:endParaRPr lang="en-US" dirty="0"/>
           </a:p>
@@ -2652,7 +2652,7 @@
           <a:p>
             <a:fld id="{96DFF08F-DC6B-4601-B491-B0F83F6DD2DA}" type="datetimeFigureOut">
               <a:rPr lang="en-US" dirty="0"/>
-              <a:t>8/15/2017</a:t>
+              <a:t>9/15/2017</a:t>
             </a:fld>
             <a:endParaRPr lang="en-US" dirty="0"/>
           </a:p>
@@ -2901,7 +2901,7 @@
             <a:fld id="{96DFF08F-DC6B-4601-B491-B0F83F6DD2DA}" type="datetimeFigureOut">
               <a:rPr lang="en-US" dirty="0"/>
               <a:pPr/>
-              <a:t>8/15/2017</a:t>
+              <a:t>9/15/2017</a:t>
             </a:fld>
             <a:endParaRPr lang="en-US" dirty="0"/>
           </a:p>
@@ -5996,85 +5996,51 @@
           <a:p>
             <a:r>
               <a:rPr lang="ru-RU" smtClean="0"/>
-              <a:t>Но что если заменить его на</a:t>
-            </a:r>
-          </a:p>
-          <a:p>
-            <a:pPr marL="45720" indent="0">
-              <a:buNone/>
+              <a:t>Но что если произойдёт одна из двух (неприятных для </a:t>
+            </a:r>
+            <a:r>
+              <a:rPr lang="en-US" smtClean="0"/>
+              <a:t>auto</a:t>
+            </a:r>
+            <a:r>
+              <a:rPr lang="ru-RU" smtClean="0"/>
+              <a:t>) вещей:</a:t>
+            </a:r>
+          </a:p>
+          <a:p>
+            <a:pPr marL="731520" lvl="1" indent="-457200">
+              <a:buFont typeface="+mj-lt"/>
+              <a:buAutoNum type="arabicPeriod"/>
             </a:pPr>
             <a:r>
-              <a:rPr lang="en-US" smtClean="0">
-                <a:latin typeface="Consolas" panose="020B0609020204030204" pitchFamily="49" charset="0"/>
-              </a:rPr>
-              <a:t>template &lt;typename T&gt; int </a:t>
-            </a:r>
-            <a:r>
-              <a:rPr lang="en-US">
-                <a:latin typeface="Consolas" panose="020B0609020204030204" pitchFamily="49" charset="0"/>
-              </a:rPr>
-              <a:t>foo </a:t>
-            </a:r>
-            <a:r>
-              <a:rPr lang="en-US" smtClean="0">
-                <a:latin typeface="Consolas" panose="020B0609020204030204" pitchFamily="49" charset="0"/>
-              </a:rPr>
-              <a:t>(</a:t>
-            </a:r>
-            <a:r>
-              <a:rPr lang="en-US" smtClean="0">
+              <a:rPr lang="ru-RU" smtClean="0"/>
+              <a:t>Изменится само уточнение</a:t>
+            </a:r>
+          </a:p>
+          <a:p>
+            <a:pPr marL="274320" lvl="1" indent="0">
+              <a:buNone/>
+            </a:pPr>
+            <a:r>
+              <a:rPr lang="en-US" smtClean="0">
+                <a:latin typeface="Consolas" panose="020B0609020204030204" pitchFamily="49" charset="0"/>
+              </a:rPr>
+              <a:t>int </a:t>
+            </a:r>
+            <a:r>
+              <a:rPr lang="en-US">
+                <a:latin typeface="Consolas" panose="020B0609020204030204" pitchFamily="49" charset="0"/>
+              </a:rPr>
+              <a:t>foo (</a:t>
+            </a:r>
+            <a:r>
+              <a:rPr lang="en-US">
                 <a:solidFill>
                   <a:srgbClr val="0000FF"/>
                 </a:solidFill>
                 <a:latin typeface="Consolas" panose="020B0609020204030204" pitchFamily="49" charset="0"/>
               </a:rPr>
-              <a:t>const T&amp;</a:t>
-            </a:r>
-            <a:r>
-              <a:rPr lang="en-US" smtClean="0">
-                <a:latin typeface="Consolas" panose="020B0609020204030204" pitchFamily="49" charset="0"/>
-              </a:rPr>
-              <a:t> </a:t>
-            </a:r>
-            <a:r>
-              <a:rPr lang="en-US">
-                <a:latin typeface="Consolas" panose="020B0609020204030204" pitchFamily="49" charset="0"/>
-              </a:rPr>
-              <a:t>x) {</a:t>
-            </a:r>
-            <a:br>
-              <a:rPr lang="en-US">
-                <a:latin typeface="Consolas" panose="020B0609020204030204" pitchFamily="49" charset="0"/>
-              </a:rPr>
-            </a:br>
-            <a:r>
-              <a:rPr lang="en-US">
-                <a:latin typeface="Consolas" panose="020B0609020204030204" pitchFamily="49" charset="0"/>
-              </a:rPr>
-              <a:t>  // </a:t>
-            </a:r>
-            <a:r>
-              <a:rPr lang="ru-RU">
-                <a:latin typeface="Consolas" panose="020B0609020204030204" pitchFamily="49" charset="0"/>
-              </a:rPr>
-              <a:t>тут какой-то код</a:t>
-            </a:r>
-            <a:br>
-              <a:rPr lang="ru-RU">
-                <a:latin typeface="Consolas" panose="020B0609020204030204" pitchFamily="49" charset="0"/>
-              </a:rPr>
-            </a:br>
-            <a:r>
-              <a:rPr lang="ru-RU">
-                <a:latin typeface="Consolas" panose="020B0609020204030204" pitchFamily="49" charset="0"/>
-              </a:rPr>
-              <a:t> </a:t>
-            </a:r>
-            <a:r>
-              <a:rPr lang="en-US" smtClean="0">
-                <a:latin typeface="Consolas" panose="020B0609020204030204" pitchFamily="49" charset="0"/>
-              </a:rPr>
-              <a:t> </a:t>
+              <a:t>const </a:t>
             </a:r>
             <a:r>
               <a:rPr lang="en-US" smtClean="0">
@@ -6083,7 +6049,7 @@
                 </a:solidFill>
                 <a:latin typeface="Consolas" panose="020B0609020204030204" pitchFamily="49" charset="0"/>
               </a:rPr>
-              <a:t>auto T&amp;</a:t>
+              <a:t>float&amp;</a:t>
             </a:r>
             <a:r>
               <a:rPr lang="en-US" smtClean="0">
@@ -6095,18 +6061,78 @@
               <a:rPr lang="en-US">
                 <a:latin typeface="Consolas" panose="020B0609020204030204" pitchFamily="49" charset="0"/>
               </a:rPr>
-              <a:t>tmp = x;</a:t>
-            </a:r>
-            <a:br>
-              <a:rPr lang="en-US">
-                <a:latin typeface="Consolas" panose="020B0609020204030204" pitchFamily="49" charset="0"/>
-              </a:rPr>
-            </a:br>
-            <a:r>
-              <a:rPr lang="en-US" smtClean="0">
-                <a:latin typeface="Consolas" panose="020B0609020204030204" pitchFamily="49" charset="0"/>
-              </a:rPr>
-              <a:t>}</a:t>
+              <a:t>x</a:t>
+            </a:r>
+            <a:r>
+              <a:rPr lang="en-US" smtClean="0">
+                <a:latin typeface="Consolas" panose="020B0609020204030204" pitchFamily="49" charset="0"/>
+              </a:rPr>
+              <a:t>)</a:t>
+            </a:r>
+            <a:endParaRPr lang="ru-RU" smtClean="0"/>
+          </a:p>
+          <a:p>
+            <a:pPr marL="731520" lvl="1" indent="-457200">
+              <a:buFont typeface="+mj-lt"/>
+              <a:buAutoNum type="arabicPeriod" startAt="2"/>
+            </a:pPr>
+            <a:r>
+              <a:rPr lang="ru-RU" smtClean="0"/>
+              <a:t>Захочется объявить переменную с другим инициализатором?</a:t>
+            </a:r>
+            <a:endParaRPr lang="en-US"/>
+          </a:p>
+          <a:p>
+            <a:pPr marL="274320" lvl="1" indent="0">
+              <a:buNone/>
+            </a:pPr>
+            <a:r>
+              <a:rPr lang="en-US" smtClean="0">
+                <a:solidFill>
+                  <a:srgbClr val="FF0000"/>
+                </a:solidFill>
+                <a:latin typeface="Consolas" panose="020B0609020204030204" pitchFamily="49" charset="0"/>
+              </a:rPr>
+              <a:t>auto</a:t>
+            </a:r>
+            <a:r>
+              <a:rPr lang="en-US" smtClean="0">
+                <a:solidFill>
+                  <a:srgbClr val="0000FF"/>
+                </a:solidFill>
+                <a:latin typeface="Consolas" panose="020B0609020204030204" pitchFamily="49" charset="0"/>
+              </a:rPr>
+              <a:t> </a:t>
+            </a:r>
+            <a:r>
+              <a:rPr lang="en-US" smtClean="0">
+                <a:latin typeface="Consolas" panose="020B0609020204030204" pitchFamily="49" charset="0"/>
+              </a:rPr>
+              <a:t>tmp </a:t>
+            </a:r>
+            <a:r>
+              <a:rPr lang="en-US">
+                <a:latin typeface="Consolas" panose="020B0609020204030204" pitchFamily="49" charset="0"/>
+              </a:rPr>
+              <a:t>= </a:t>
+            </a:r>
+            <a:r>
+              <a:rPr lang="en-US" smtClean="0">
+                <a:latin typeface="Consolas" panose="020B0609020204030204" pitchFamily="49" charset="0"/>
+              </a:rPr>
+              <a:t>0.0f; // </a:t>
+            </a:r>
+            <a:r>
+              <a:rPr lang="ru-RU" smtClean="0">
+                <a:latin typeface="Consolas" panose="020B0609020204030204" pitchFamily="49" charset="0"/>
+              </a:rPr>
+              <a:t>но мы-то хотим </a:t>
+            </a:r>
+            <a:r>
+              <a:rPr lang="en-US" smtClean="0">
+                <a:latin typeface="Consolas" panose="020B0609020204030204" pitchFamily="49" charset="0"/>
+              </a:rPr>
+              <a:t>const float&amp;</a:t>
             </a:r>
             <a:endParaRPr lang="ru-RU" smtClean="0">
               <a:latin typeface="Consolas" panose="020B0609020204030204" pitchFamily="49" charset="0"/>
@@ -6115,19 +6141,7 @@
           <a:p>
             <a:r>
               <a:rPr lang="ru-RU" smtClean="0"/>
-              <a:t>Хватит ли этого? А если </a:t>
-            </a:r>
-            <a:r>
-              <a:rPr lang="en-US" smtClean="0"/>
-              <a:t>T </a:t>
-            </a:r>
-            <a:r>
-              <a:rPr lang="ru-RU" smtClean="0"/>
-              <a:t>вдруг изменится на </a:t>
-            </a:r>
-            <a:r>
-              <a:rPr lang="en-US" smtClean="0"/>
-              <a:t>U?</a:t>
+              <a:t>Эти проблемы вызваны тем, что "совместимый" тип не означает "идентичный"</a:t>
             </a:r>
             <a:endParaRPr lang="en-US"/>
           </a:p>
@@ -6220,69 +6234,59 @@
           <a:p>
             <a:r>
               <a:rPr lang="ru-RU" smtClean="0"/>
-              <a:t>Механизм </a:t>
+              <a:t>Выходом из положения является использование </a:t>
             </a:r>
             <a:r>
               <a:rPr lang="en-US" smtClean="0"/>
-              <a:t>auto </a:t>
-            </a:r>
-            <a:r>
-              <a:rPr lang="ru-RU" smtClean="0"/>
-              <a:t>всё-таки режет типы. В мотивирующем примере был код:</a:t>
-            </a:r>
+              <a:t>decltype</a:t>
+            </a:r>
+            <a:endParaRPr lang="ru-RU" smtClean="0"/>
+          </a:p>
+          <a:p>
+            <a:r>
+              <a:rPr lang="en-US" smtClean="0"/>
+              <a:t>decltype(name) </a:t>
+            </a:r>
+            <a:r>
+              <a:rPr lang="ru-RU" smtClean="0"/>
+              <a:t>означает тип, с которым объявлено имя </a:t>
+            </a:r>
+            <a:r>
+              <a:rPr lang="en-US" smtClean="0"/>
+              <a:t>name.</a:t>
+            </a:r>
+            <a:endParaRPr lang="ru-RU" smtClean="0"/>
           </a:p>
           <a:p>
             <a:pPr marL="45720" indent="0">
               <a:buNone/>
             </a:pPr>
             <a:r>
-              <a:rPr lang="en-US">
-                <a:latin typeface="Consolas" panose="020B0609020204030204" pitchFamily="49" charset="0"/>
-              </a:rPr>
-              <a:t>int foo (</a:t>
-            </a:r>
-            <a:r>
-              <a:rPr lang="en-US">
+              <a:rPr lang="en-US" smtClean="0">
+                <a:latin typeface="Consolas" panose="020B0609020204030204" pitchFamily="49" charset="0"/>
+              </a:rPr>
+              <a:t>int </a:t>
+            </a:r>
+            <a:r>
+              <a:rPr lang="en-US">
+                <a:latin typeface="Consolas" panose="020B0609020204030204" pitchFamily="49" charset="0"/>
+              </a:rPr>
+              <a:t>foo </a:t>
+            </a:r>
+            <a:r>
+              <a:rPr lang="en-US" smtClean="0">
+                <a:latin typeface="Consolas" panose="020B0609020204030204" pitchFamily="49" charset="0"/>
+              </a:rPr>
+              <a:t>(</a:t>
+            </a:r>
+            <a:r>
+              <a:rPr lang="en-US" smtClean="0">
                 <a:solidFill>
                   <a:srgbClr val="0000FF"/>
                 </a:solidFill>
                 <a:latin typeface="Consolas" panose="020B0609020204030204" pitchFamily="49" charset="0"/>
               </a:rPr>
-              <a:t>float</a:t>
-            </a:r>
-            <a:r>
-              <a:rPr lang="en-US">
-                <a:latin typeface="Consolas" panose="020B0609020204030204" pitchFamily="49" charset="0"/>
-              </a:rPr>
-              <a:t> x) {</a:t>
-            </a:r>
-            <a:br>
-              <a:rPr lang="en-US">
-                <a:latin typeface="Consolas" panose="020B0609020204030204" pitchFamily="49" charset="0"/>
-              </a:rPr>
-            </a:br>
-            <a:r>
-              <a:rPr lang="en-US">
-                <a:latin typeface="Consolas" panose="020B0609020204030204" pitchFamily="49" charset="0"/>
-              </a:rPr>
-              <a:t>  // </a:t>
-            </a:r>
-            <a:r>
-              <a:rPr lang="ru-RU">
-                <a:latin typeface="Consolas" panose="020B0609020204030204" pitchFamily="49" charset="0"/>
-              </a:rPr>
-              <a:t>тут какой-то код</a:t>
-            </a:r>
-            <a:br>
-              <a:rPr lang="ru-RU">
-                <a:latin typeface="Consolas" panose="020B0609020204030204" pitchFamily="49" charset="0"/>
-              </a:rPr>
-            </a:br>
-            <a:r>
-              <a:rPr lang="ru-RU">
-                <a:latin typeface="Consolas" panose="020B0609020204030204" pitchFamily="49" charset="0"/>
-              </a:rPr>
-              <a:t>  </a:t>
+              <a:t>const </a:t>
             </a:r>
             <a:r>
               <a:rPr lang="en-US" smtClean="0">
@@ -6291,60 +6295,7 @@
                 </a:solidFill>
                 <a:latin typeface="Consolas" panose="020B0609020204030204" pitchFamily="49" charset="0"/>
               </a:rPr>
-              <a:t>auto</a:t>
-            </a:r>
-            <a:r>
-              <a:rPr lang="en-US" smtClean="0">
-                <a:latin typeface="Consolas" panose="020B0609020204030204" pitchFamily="49" charset="0"/>
-              </a:rPr>
-              <a:t> </a:t>
-            </a:r>
-            <a:r>
-              <a:rPr lang="en-US">
-                <a:latin typeface="Consolas" panose="020B0609020204030204" pitchFamily="49" charset="0"/>
-              </a:rPr>
-              <a:t>tmp = x;</a:t>
-            </a:r>
-            <a:br>
-              <a:rPr lang="en-US">
-                <a:latin typeface="Consolas" panose="020B0609020204030204" pitchFamily="49" charset="0"/>
-              </a:rPr>
-            </a:br>
-            <a:r>
-              <a:rPr lang="en-US" smtClean="0">
-                <a:latin typeface="Consolas" panose="020B0609020204030204" pitchFamily="49" charset="0"/>
-              </a:rPr>
-              <a:t>}</a:t>
-            </a:r>
-            <a:endParaRPr lang="ru-RU" smtClean="0"/>
-          </a:p>
-          <a:p>
-            <a:r>
-              <a:rPr lang="ru-RU" smtClean="0"/>
-              <a:t>Но что если заменить его на</a:t>
-            </a:r>
-          </a:p>
-          <a:p>
-            <a:pPr marL="45720" indent="0">
-              <a:buNone/>
-            </a:pPr>
-            <a:r>
-              <a:rPr lang="en-US" smtClean="0">
-                <a:latin typeface="Consolas" panose="020B0609020204030204" pitchFamily="49" charset="0"/>
-              </a:rPr>
-              <a:t>template &lt;typename U&gt; int </a:t>
-            </a:r>
-            <a:r>
-              <a:rPr lang="en-US">
-                <a:latin typeface="Consolas" panose="020B0609020204030204" pitchFamily="49" charset="0"/>
-              </a:rPr>
-              <a:t>foo </a:t>
-            </a:r>
-            <a:r>
-              <a:rPr lang="en-US" smtClean="0">
-                <a:latin typeface="Consolas" panose="020B0609020204030204" pitchFamily="49" charset="0"/>
-              </a:rPr>
-              <a:t>(</a:t>
+              <a:t>float</a:t>
             </a:r>
             <a:r>
               <a:rPr lang="en-US" smtClean="0">
@@ -6353,7 +6304,7 @@
                 </a:solidFill>
                 <a:latin typeface="Consolas" panose="020B0609020204030204" pitchFamily="49" charset="0"/>
               </a:rPr>
-              <a:t>const U&amp;</a:t>
+              <a:t>&amp;</a:t>
             </a:r>
             <a:r>
               <a:rPr lang="en-US" smtClean="0">
@@ -6420,7 +6371,31 @@
               <a:rPr lang="en-US">
                 <a:latin typeface="Consolas" panose="020B0609020204030204" pitchFamily="49" charset="0"/>
               </a:rPr>
-              <a:t>tmp = x;</a:t>
+              <a:t>tmp = </a:t>
+            </a:r>
+            <a:r>
+              <a:rPr lang="en-US" smtClean="0">
+                <a:latin typeface="Consolas" panose="020B0609020204030204" pitchFamily="49" charset="0"/>
+              </a:rPr>
+              <a:t>0.0f; // ok, </a:t>
+            </a:r>
+            <a:r>
+              <a:rPr lang="ru-RU" smtClean="0">
+                <a:latin typeface="Consolas" panose="020B0609020204030204" pitchFamily="49" charset="0"/>
+              </a:rPr>
+              <a:t>и значит ровно </a:t>
+            </a:r>
+            <a:r>
+              <a:rPr lang="ru-RU" smtClean="0">
+                <a:latin typeface="Consolas" panose="020B0609020204030204" pitchFamily="49" charset="0"/>
+              </a:rPr>
+              <a:t>то, что нужно</a:t>
+            </a:r>
+            <a:r>
+              <a:rPr lang="en-US">
+                <a:latin typeface="Consolas" panose="020B0609020204030204" pitchFamily="49" charset="0"/>
+              </a:rPr>
+              <a:t/>
             </a:r>
             <a:br>
               <a:rPr lang="en-US">
@@ -6440,19 +6415,15 @@
           <a:p>
             <a:r>
               <a:rPr lang="ru-RU" smtClean="0"/>
-              <a:t>Хватит ли этого? А если </a:t>
+              <a:t>Теперь всё </a:t>
             </a:r>
             <a:r>
               <a:rPr lang="en-US" smtClean="0"/>
-              <a:t>T </a:t>
-            </a:r>
-            <a:r>
-              <a:rPr lang="ru-RU" smtClean="0"/>
-              <a:t>вдруг изменится на </a:t>
-            </a:r>
-            <a:r>
-              <a:rPr lang="en-US" smtClean="0"/>
-              <a:t>U?</a:t>
+              <a:t>ok: </a:t>
+            </a:r>
+            <a:r>
+              <a:rPr lang="ru-RU" smtClean="0"/>
+              <a:t>мы указываем, что хотим в точности такой тип, а не просто "какой-то совместимый".</a:t>
             </a:r>
             <a:endParaRPr lang="en-US"/>
           </a:p>
@@ -7728,7 +7699,19 @@
               <a:rPr lang="ru-RU" smtClean="0">
                 <a:latin typeface="Consolas" panose="020B0609020204030204" pitchFamily="49" charset="0"/>
               </a:rPr>
-              <a:t>во, то, что нужно</a:t>
+              <a:t>это именно</a:t>
+            </a:r>
+            <a:r>
+              <a:rPr lang="ru-RU" smtClean="0">
+                <a:latin typeface="Consolas" panose="020B0609020204030204" pitchFamily="49" charset="0"/>
+              </a:rPr>
+              <a:t> </a:t>
+            </a:r>
+            <a:r>
+              <a:rPr lang="ru-RU" smtClean="0">
+                <a:latin typeface="Consolas" panose="020B0609020204030204" pitchFamily="49" charset="0"/>
+              </a:rPr>
+              <a:t>то, что нужно</a:t>
             </a:r>
           </a:p>
           <a:p>
@@ -7919,8 +7902,13 @@
           <a:p>
             <a:r>
               <a:rPr lang="ru-RU" smtClean="0"/>
-              <a:t>Что лучше для мотивационного примера</a:t>
-            </a:r>
+              <a:t>Что лучше для мотивационного </a:t>
+            </a:r>
+            <a:r>
+              <a:rPr lang="ru-RU" smtClean="0"/>
+              <a:t>примера?</a:t>
+            </a:r>
+            <a:endParaRPr lang="ru-RU" smtClean="0"/>
           </a:p>
           <a:p>
             <a:r>
@@ -9555,13 +9543,7 @@
               <a:rPr lang="en-US">
                 <a:latin typeface="Consolas" panose="020B0609020204030204" pitchFamily="49" charset="0"/>
               </a:rPr>
-              <a:t>template &lt;typename T, </a:t>
-            </a:r>
-            <a:r>
-              <a:rPr lang="en-US">
-                <a:latin typeface="Consolas" panose="020B0609020204030204" pitchFamily="49" charset="0"/>
-              </a:rPr>
-              <a:t>typename </a:t>
+              <a:t>template &lt;typename T, typename </a:t>
             </a:r>
             <a:r>
               <a:rPr lang="en-US" smtClean="0">
@@ -9590,13 +9572,7 @@
               <a:rPr lang="en-US">
                 <a:latin typeface="Consolas" panose="020B0609020204030204" pitchFamily="49" charset="0"/>
               </a:rPr>
-              <a:t>min(T x, S y) -&gt; decltype(x &lt; y ? x : y</a:t>
-            </a:r>
-            <a:r>
-              <a:rPr lang="en-US">
-                <a:latin typeface="Consolas" panose="020B0609020204030204" pitchFamily="49" charset="0"/>
-              </a:rPr>
-              <a:t>) </a:t>
+              <a:t>min(T x, S y) -&gt; decltype(x &lt; y ? x : y) </a:t>
             </a:r>
             <a:r>
               <a:rPr lang="en-US" smtClean="0">
@@ -9625,13 +9601,7 @@
               <a:rPr lang="en-US">
                 <a:latin typeface="Consolas" panose="020B0609020204030204" pitchFamily="49" charset="0"/>
               </a:rPr>
-              <a:t>return x &lt; y ? x : </a:t>
-            </a:r>
-            <a:r>
-              <a:rPr lang="en-US">
-                <a:latin typeface="Consolas" panose="020B0609020204030204" pitchFamily="49" charset="0"/>
-              </a:rPr>
-              <a:t>y</a:t>
+              <a:t>return x &lt; y ? x : y</a:t>
             </a:r>
             <a:r>
               <a:rPr lang="en-US" smtClean="0">
@@ -9759,13 +9729,7 @@
               <a:rPr lang="en-US">
                 <a:latin typeface="Consolas" panose="020B0609020204030204" pitchFamily="49" charset="0"/>
               </a:rPr>
-              <a:t>template &lt;typename T, </a:t>
-            </a:r>
-            <a:r>
-              <a:rPr lang="en-US">
-                <a:latin typeface="Consolas" panose="020B0609020204030204" pitchFamily="49" charset="0"/>
-              </a:rPr>
-              <a:t>typename </a:t>
+              <a:t>template &lt;typename T, typename </a:t>
             </a:r>
             <a:r>
               <a:rPr lang="en-US" smtClean="0">
@@ -9809,13 +9773,7 @@
               <a:rPr lang="en-US">
                 <a:latin typeface="Consolas" panose="020B0609020204030204" pitchFamily="49" charset="0"/>
               </a:rPr>
-              <a:t>min(T x, S y) -&gt; decltype(x &lt; y ? x : y</a:t>
-            </a:r>
-            <a:r>
-              <a:rPr lang="en-US">
-                <a:latin typeface="Consolas" panose="020B0609020204030204" pitchFamily="49" charset="0"/>
-              </a:rPr>
-              <a:t>) </a:t>
+              <a:t>min(T x, S y) -&gt; decltype(x &lt; y ? x : y) </a:t>
             </a:r>
             <a:r>
               <a:rPr lang="en-US" smtClean="0">
@@ -9872,13 +9830,7 @@
               <a:rPr lang="en-US">
                 <a:latin typeface="Consolas" panose="020B0609020204030204" pitchFamily="49" charset="0"/>
               </a:rPr>
-              <a:t>return x &lt; y ? x : </a:t>
-            </a:r>
-            <a:r>
-              <a:rPr lang="en-US">
-                <a:latin typeface="Consolas" panose="020B0609020204030204" pitchFamily="49" charset="0"/>
-              </a:rPr>
-              <a:t>y</a:t>
+              <a:t>return x &lt; y ? x : y</a:t>
             </a:r>
             <a:r>
               <a:rPr lang="en-US" smtClean="0">
@@ -9981,13 +9933,7 @@
               <a:rPr lang="en-US">
                 <a:latin typeface="Consolas" panose="020B0609020204030204" pitchFamily="49" charset="0"/>
               </a:rPr>
-              <a:t>&lt; y ? x </a:t>
-            </a:r>
-            <a:r>
-              <a:rPr lang="en-US">
-                <a:latin typeface="Consolas" panose="020B0609020204030204" pitchFamily="49" charset="0"/>
-              </a:rPr>
-              <a:t>: </a:t>
+              <a:t>&lt; y ? x : </a:t>
             </a:r>
             <a:r>
               <a:rPr lang="en-US" smtClean="0">
@@ -10431,13 +10377,7 @@
               <a:rPr lang="en-US">
                 <a:latin typeface="Consolas" panose="020B0609020204030204" pitchFamily="49" charset="0"/>
               </a:rPr>
-              <a:t>template &lt;typename T, typename S</a:t>
-            </a:r>
-            <a:r>
-              <a:rPr lang="en-US">
-                <a:latin typeface="Consolas" panose="020B0609020204030204" pitchFamily="49" charset="0"/>
-              </a:rPr>
-              <a:t>&gt; </a:t>
+              <a:t>template &lt;typename T, typename S&gt; </a:t>
             </a:r>
             <a:r>
               <a:rPr lang="ru-RU">
@@ -10460,13 +10400,7 @@
               <a:rPr lang="en-US">
                 <a:latin typeface="Consolas" panose="020B0609020204030204" pitchFamily="49" charset="0"/>
               </a:rPr>
-              <a:t>auto min(T x, S y</a:t>
-            </a:r>
-            <a:r>
-              <a:rPr lang="en-US">
-                <a:latin typeface="Consolas" panose="020B0609020204030204" pitchFamily="49" charset="0"/>
-              </a:rPr>
-              <a:t>) </a:t>
+              <a:t>auto min(T x, S y) </a:t>
             </a:r>
             <a:r>
               <a:rPr lang="en-US" smtClean="0">
@@ -10489,13 +10423,7 @@
               <a:rPr lang="en-US">
                 <a:latin typeface="Consolas" panose="020B0609020204030204" pitchFamily="49" charset="0"/>
               </a:rPr>
-              <a:t>x &lt; y ? x </a:t>
-            </a:r>
-            <a:r>
-              <a:rPr lang="en-US">
-                <a:latin typeface="Consolas" panose="020B0609020204030204" pitchFamily="49" charset="0"/>
-              </a:rPr>
-              <a:t>: </a:t>
+              <a:t>x &lt; y ? x : </a:t>
             </a:r>
             <a:r>
               <a:rPr lang="en-US" smtClean="0">
@@ -10540,12 +10468,6 @@
               </a:rPr>
               <a:t>auto bad_sum_to (int i) {</a:t>
             </a:r>
-            <a:r>
-              <a:rPr lang="en-US">
-                <a:latin typeface="Consolas" panose="020B0609020204030204" pitchFamily="49" charset="0"/>
-              </a:rPr>
-              <a:t/>
-            </a:r>
             <a:br>
               <a:rPr lang="en-US">
                 <a:latin typeface="Consolas" panose="020B0609020204030204" pitchFamily="49" charset="0"/>
@@ -10567,13 +10489,7 @@
               <a:rPr lang="en-US">
                 <a:latin typeface="Consolas" panose="020B0609020204030204" pitchFamily="49" charset="0"/>
               </a:rPr>
-              <a:t>(i &gt; </a:t>
-            </a:r>
-            <a:r>
-              <a:rPr lang="en-US">
-                <a:latin typeface="Consolas" panose="020B0609020204030204" pitchFamily="49" charset="0"/>
-              </a:rPr>
-              <a:t>2</a:t>
+              <a:t>(i &gt; 2</a:t>
             </a:r>
             <a:r>
               <a:rPr lang="en-US" smtClean="0">
@@ -10597,13 +10513,7 @@
               <a:rPr lang="en-US">
                 <a:latin typeface="Consolas" panose="020B0609020204030204" pitchFamily="49" charset="0"/>
               </a:rPr>
-              <a:t>bad_sum_to (i-1) </a:t>
-            </a:r>
-            <a:r>
-              <a:rPr lang="en-US">
-                <a:latin typeface="Consolas" panose="020B0609020204030204" pitchFamily="49" charset="0"/>
-              </a:rPr>
-              <a:t>+ </a:t>
+              <a:t>bad_sum_to (i-1) + </a:t>
             </a:r>
             <a:r>
               <a:rPr lang="en-US" smtClean="0">
@@ -10746,24 +10656,36 @@
               <a:rPr lang="en-US" smtClean="0">
                 <a:latin typeface="Consolas" panose="020B0609020204030204" pitchFamily="49" charset="0"/>
               </a:rPr>
-              <a:t>int main () {</a:t>
-            </a:r>
-          </a:p>
-          <a:p>
-            <a:pPr marL="45720" indent="0">
-              <a:buNone/>
-            </a:pPr>
-            <a:r>
-              <a:rPr lang="en-US">
-                <a:latin typeface="Consolas" panose="020B0609020204030204" pitchFamily="49" charset="0"/>
-              </a:rPr>
-              <a:t> </a:t>
-            </a:r>
-            <a:r>
-              <a:rPr lang="en-US" smtClean="0">
-                <a:latin typeface="Consolas" panose="020B0609020204030204" pitchFamily="49" charset="0"/>
-              </a:rPr>
-              <a:t> func();                  </a:t>
+              <a:t>int main () </a:t>
+            </a:r>
+            <a:r>
+              <a:rPr lang="en-US" smtClean="0">
+                <a:latin typeface="Consolas" panose="020B0609020204030204" pitchFamily="49" charset="0"/>
+              </a:rPr>
+              <a:t>{</a:t>
+            </a:r>
+            <a:r>
+              <a:rPr lang="ru-RU" smtClean="0">
+                <a:latin typeface="Consolas" panose="020B0609020204030204" pitchFamily="49" charset="0"/>
+              </a:rPr>
+              <a:t/>
+            </a:r>
+            <a:br>
+              <a:rPr lang="ru-RU" smtClean="0">
+                <a:latin typeface="Consolas" panose="020B0609020204030204" pitchFamily="49" charset="0"/>
+              </a:rPr>
+            </a:br>
+            <a:r>
+              <a:rPr lang="en-US" smtClean="0">
+                <a:latin typeface="Consolas" panose="020B0609020204030204" pitchFamily="49" charset="0"/>
+              </a:rPr>
+              <a:t>  </a:t>
+            </a:r>
+            <a:r>
+              <a:rPr lang="en-US" smtClean="0">
+                <a:latin typeface="Consolas" panose="020B0609020204030204" pitchFamily="49" charset="0"/>
+              </a:rPr>
+              <a:t>func();                  </a:t>
             </a:r>
             <a:r>
               <a:rPr lang="en-US" smtClean="0">
@@ -10772,19 +10694,43 @@
                 </a:solidFill>
                 <a:latin typeface="Consolas" panose="020B0609020204030204" pitchFamily="49" charset="0"/>
               </a:rPr>
-              <a:t>// use before deduction</a:t>
-            </a:r>
-          </a:p>
-          <a:p>
-            <a:pPr marL="45720" indent="0">
-              <a:buNone/>
-            </a:pPr>
+              <a:t>// use before </a:t>
+            </a:r>
+            <a:r>
+              <a:rPr lang="en-US" smtClean="0">
+                <a:solidFill>
+                  <a:srgbClr val="FF0000"/>
+                </a:solidFill>
+                <a:latin typeface="Consolas" panose="020B0609020204030204" pitchFamily="49" charset="0"/>
+              </a:rPr>
+              <a:t>deduction</a:t>
+            </a:r>
+            <a:r>
+              <a:rPr lang="ru-RU" smtClean="0">
+                <a:solidFill>
+                  <a:srgbClr val="FF0000"/>
+                </a:solidFill>
+                <a:latin typeface="Consolas" panose="020B0609020204030204" pitchFamily="49" charset="0"/>
+              </a:rPr>
+              <a:t/>
+            </a:r>
+            <a:br>
+              <a:rPr lang="ru-RU" smtClean="0">
+                <a:solidFill>
+                  <a:srgbClr val="FF0000"/>
+                </a:solidFill>
+                <a:latin typeface="Consolas" panose="020B0609020204030204" pitchFamily="49" charset="0"/>
+              </a:rPr>
+            </a:br>
             <a:r>
               <a:rPr lang="en-US" smtClean="0">
                 <a:latin typeface="Consolas" panose="020B0609020204030204" pitchFamily="49" charset="0"/>
               </a:rPr>
               <a:t>}</a:t>
             </a:r>
+            <a:endParaRPr lang="en-US" smtClean="0">
+              <a:latin typeface="Consolas" panose="020B0609020204030204" pitchFamily="49" charset="0"/>
+            </a:endParaRPr>
           </a:p>
           <a:p>
             <a:pPr marL="45720" indent="0">
@@ -10924,19 +10870,7 @@
               <a:rPr lang="en-US">
                 <a:latin typeface="Consolas" panose="020B0609020204030204" pitchFamily="49" charset="0"/>
               </a:rPr>
-              <a:t>string&amp; lookup2</a:t>
-            </a:r>
-            <a:r>
-              <a:rPr lang="en-US">
-                <a:latin typeface="Consolas" panose="020B0609020204030204" pitchFamily="49" charset="0"/>
-              </a:rPr>
-              <a:t>();</a:t>
-            </a:r>
-            <a:r>
-              <a:rPr lang="en-US">
-                <a:latin typeface="Consolas" panose="020B0609020204030204" pitchFamily="49" charset="0"/>
-              </a:rPr>
-              <a:t> </a:t>
+              <a:t>string&amp; lookup2(); </a:t>
             </a:r>
             <a:endParaRPr lang="ru-RU" smtClean="0">
               <a:latin typeface="Consolas" panose="020B0609020204030204" pitchFamily="49" charset="0"/>
@@ -10956,13 +10890,7 @@
               <a:rPr lang="en-US">
                 <a:latin typeface="Consolas" panose="020B0609020204030204" pitchFamily="49" charset="0"/>
               </a:rPr>
-              <a:t>do1() { return lookup1</a:t>
-            </a:r>
-            <a:r>
-              <a:rPr lang="en-US">
-                <a:latin typeface="Consolas" panose="020B0609020204030204" pitchFamily="49" charset="0"/>
-              </a:rPr>
-              <a:t>(); </a:t>
+              <a:t>do1() { return lookup1(); </a:t>
             </a:r>
             <a:r>
               <a:rPr lang="en-US" smtClean="0">
@@ -10981,20 +10909,13 @@
                 <a:latin typeface="Consolas" panose="020B0609020204030204" pitchFamily="49" charset="0"/>
                 <a:sym typeface="Symbol" panose="05050102010706020507" pitchFamily="18" charset="2"/>
               </a:rPr>
-              <a:t> </a:t>
-            </a:r>
-            <a:r>
-              <a:rPr lang="en-US">
+              <a:t> string </a:t>
+            </a:r>
+            <a:r>
+              <a:rPr lang="en-US" smtClean="0">
                 <a:latin typeface="Consolas" panose="020B0609020204030204" pitchFamily="49" charset="0"/>
                 <a:sym typeface="Symbol" panose="05050102010706020507" pitchFamily="18" charset="2"/>
               </a:rPr>
-              <a:t>string </a:t>
-            </a:r>
-            <a:r>
-              <a:rPr lang="en-US" smtClean="0">
-                <a:latin typeface="Consolas" panose="020B0609020204030204" pitchFamily="49" charset="0"/>
-                <a:sym typeface="Symbol" panose="05050102010706020507" pitchFamily="18" charset="2"/>
-              </a:rPr>
               <a:t>do1()</a:t>
             </a:r>
             <a:r>
@@ -11018,19 +10939,7 @@
               <a:rPr lang="en-US">
                 <a:latin typeface="Consolas" panose="020B0609020204030204" pitchFamily="49" charset="0"/>
               </a:rPr>
-              <a:t>do2() { return lookup2(); </a:t>
-            </a:r>
-            <a:r>
-              <a:rPr lang="en-US">
-                <a:latin typeface="Consolas" panose="020B0609020204030204" pitchFamily="49" charset="0"/>
-              </a:rPr>
-              <a:t>}</a:t>
-            </a:r>
-            <a:r>
-              <a:rPr lang="en-US">
-                <a:latin typeface="Consolas" panose="020B0609020204030204" pitchFamily="49" charset="0"/>
-              </a:rPr>
-              <a:t> </a:t>
+              <a:t>do2() { return lookup2(); } </a:t>
             </a:r>
             <a:r>
               <a:rPr lang="en-US" smtClean="0">
@@ -11248,13 +11157,7 @@
               <a:rPr lang="en-US">
                 <a:latin typeface="Consolas" panose="020B0609020204030204" pitchFamily="49" charset="0"/>
               </a:rPr>
-              <a:t>decltype(auto) callme(Fun fun, Arg </a:t>
-            </a:r>
-            <a:r>
-              <a:rPr lang="en-US">
-                <a:latin typeface="Consolas" panose="020B0609020204030204" pitchFamily="49" charset="0"/>
-              </a:rPr>
-              <a:t>arg</a:t>
+              <a:t>decltype(auto) callme(Fun fun, Arg arg</a:t>
             </a:r>
             <a:r>
               <a:rPr lang="en-US" smtClean="0">
@@ -11283,19 +11186,7 @@
               <a:rPr lang="en-US">
                 <a:latin typeface="Consolas" panose="020B0609020204030204" pitchFamily="49" charset="0"/>
               </a:rPr>
-              <a:t>fun(arg);</a:t>
-            </a:r>
-            <a:r>
-              <a:rPr lang="en-US">
-                <a:latin typeface="Consolas" panose="020B0609020204030204" pitchFamily="49" charset="0"/>
-              </a:rPr>
-              <a:t> </a:t>
-            </a:r>
-            <a:r>
-              <a:rPr lang="en-US">
-                <a:latin typeface="Consolas" panose="020B0609020204030204" pitchFamily="49" charset="0"/>
-              </a:rPr>
-              <a:t/>
+              <a:t>fun(arg); </a:t>
             </a:r>
             <a:br>
               <a:rPr lang="en-US">
@@ -11448,12 +11339,6 @@
               </a:rPr>
               <a:t> lookupValue (int idx) {</a:t>
             </a:r>
-            <a:r>
-              <a:rPr lang="en-US">
-                <a:latin typeface="Consolas" panose="020B0609020204030204" pitchFamily="49" charset="0"/>
-              </a:rPr>
-              <a:t/>
-            </a:r>
             <a:br>
               <a:rPr lang="en-US">
                 <a:latin typeface="Consolas" panose="020B0609020204030204" pitchFamily="49" charset="0"/>
@@ -11471,12 +11356,6 @@
               </a:rPr>
               <a:t>ind = calcValue (idx);</a:t>
             </a:r>
-            <a:r>
-              <a:rPr lang="en-US">
-                <a:latin typeface="Consolas" panose="020B0609020204030204" pitchFamily="49" charset="0"/>
-              </a:rPr>
-              <a:t/>
-            </a:r>
             <a:br>
               <a:rPr lang="en-US">
                 <a:latin typeface="Consolas" panose="020B0609020204030204" pitchFamily="49" charset="0"/>
@@ -11494,12 +11373,6 @@
               </a:rPr>
               <a:t>val = values[ind];</a:t>
             </a:r>
-            <a:r>
-              <a:rPr lang="en-US">
-                <a:latin typeface="Consolas" panose="020B0609020204030204" pitchFamily="49" charset="0"/>
-              </a:rPr>
-              <a:t/>
-            </a:r>
             <a:br>
               <a:rPr lang="en-US">
                 <a:latin typeface="Consolas" panose="020B0609020204030204" pitchFamily="49" charset="0"/>
@@ -11516,12 +11389,6 @@
                 <a:latin typeface="Consolas" panose="020B0609020204030204" pitchFamily="49" charset="0"/>
               </a:rPr>
               <a:t>(val);</a:t>
-            </a:r>
-            <a:r>
-              <a:rPr lang="en-US">
-                <a:latin typeface="Consolas" panose="020B0609020204030204" pitchFamily="49" charset="0"/>
-              </a:rPr>
-              <a:t/>
             </a:r>
             <a:br>
               <a:rPr lang="en-US">
@@ -11632,12 +11499,6 @@
               </a:rPr>
               <a:t>// example by Scott Meyers</a:t>
             </a:r>
-            <a:r>
-              <a:rPr lang="en-US">
-                <a:latin typeface="Consolas" panose="020B0609020204030204" pitchFamily="49" charset="0"/>
-              </a:rPr>
-              <a:t/>
-            </a:r>
             <a:br>
               <a:rPr lang="en-US">
                 <a:latin typeface="Consolas" panose="020B0609020204030204" pitchFamily="49" charset="0"/>
@@ -11664,6 +11525,60 @@
               </a:rPr>
               <a:t>lookupValue (int idx) {</a:t>
             </a:r>
+            <a:br>
+              <a:rPr lang="en-US">
+                <a:latin typeface="Consolas" panose="020B0609020204030204" pitchFamily="49" charset="0"/>
+              </a:rPr>
+            </a:br>
+            <a:r>
+              <a:rPr lang="en-US" smtClean="0">
+                <a:latin typeface="Consolas" panose="020B0609020204030204" pitchFamily="49" charset="0"/>
+              </a:rPr>
+              <a:t>  auto </a:t>
+            </a:r>
+            <a:r>
+              <a:rPr lang="en-US">
+                <a:latin typeface="Consolas" panose="020B0609020204030204" pitchFamily="49" charset="0"/>
+              </a:rPr>
+              <a:t>ind = calcValue (idx);</a:t>
+            </a:r>
+            <a:br>
+              <a:rPr lang="en-US">
+                <a:latin typeface="Consolas" panose="020B0609020204030204" pitchFamily="49" charset="0"/>
+              </a:rPr>
+            </a:br>
+            <a:r>
+              <a:rPr lang="en-US" smtClean="0">
+                <a:latin typeface="Consolas" panose="020B0609020204030204" pitchFamily="49" charset="0"/>
+              </a:rPr>
+              <a:t>  auto </a:t>
+            </a:r>
+            <a:r>
+              <a:rPr lang="en-US">
+                <a:latin typeface="Consolas" panose="020B0609020204030204" pitchFamily="49" charset="0"/>
+              </a:rPr>
+              <a:t>val = values[ind</a:t>
+            </a:r>
+            <a:r>
+              <a:rPr lang="en-US" smtClean="0">
+                <a:latin typeface="Consolas" panose="020B0609020204030204" pitchFamily="49" charset="0"/>
+              </a:rPr>
+              <a:t>]; // </a:t>
+            </a:r>
+            <a:r>
+              <a:rPr lang="en-US">
+                <a:latin typeface="Consolas" panose="020B0609020204030204" pitchFamily="49" charset="0"/>
+                <a:sym typeface="Symbol" panose="05050102010706020507" pitchFamily="18" charset="2"/>
+              </a:rPr>
+              <a:t> </a:t>
+            </a:r>
+            <a:r>
+              <a:rPr lang="en-US" smtClean="0">
+                <a:latin typeface="Consolas" panose="020B0609020204030204" pitchFamily="49" charset="0"/>
+                <a:sym typeface="Symbol" panose="05050102010706020507" pitchFamily="18" charset="2"/>
+              </a:rPr>
+              <a:t>int val</a:t>
+            </a:r>
             <a:r>
               <a:rPr lang="en-US">
                 <a:latin typeface="Consolas" panose="020B0609020204030204" pitchFamily="49" charset="0"/>
@@ -11679,91 +11594,13 @@
               <a:rPr lang="en-US" smtClean="0">
                 <a:latin typeface="Consolas" panose="020B0609020204030204" pitchFamily="49" charset="0"/>
               </a:rPr>
-              <a:t>  auto </a:t>
-            </a:r>
-            <a:r>
-              <a:rPr lang="en-US">
-                <a:latin typeface="Consolas" panose="020B0609020204030204" pitchFamily="49" charset="0"/>
-              </a:rPr>
-              <a:t>ind = calcValue (idx);</a:t>
-            </a:r>
-            <a:r>
-              <a:rPr lang="en-US">
-                <a:latin typeface="Consolas" panose="020B0609020204030204" pitchFamily="49" charset="0"/>
-              </a:rPr>
-              <a:t/>
-            </a:r>
-            <a:br>
-              <a:rPr lang="en-US">
-                <a:latin typeface="Consolas" panose="020B0609020204030204" pitchFamily="49" charset="0"/>
-              </a:rPr>
-            </a:br>
-            <a:r>
-              <a:rPr lang="en-US" smtClean="0">
-                <a:latin typeface="Consolas" panose="020B0609020204030204" pitchFamily="49" charset="0"/>
-              </a:rPr>
-              <a:t>  auto </a:t>
-            </a:r>
-            <a:r>
-              <a:rPr lang="en-US">
-                <a:latin typeface="Consolas" panose="020B0609020204030204" pitchFamily="49" charset="0"/>
-              </a:rPr>
-              <a:t>val = </a:t>
-            </a:r>
-            <a:r>
-              <a:rPr lang="en-US">
-                <a:latin typeface="Consolas" panose="020B0609020204030204" pitchFamily="49" charset="0"/>
-              </a:rPr>
-              <a:t>values[ind</a:t>
-            </a:r>
-            <a:r>
-              <a:rPr lang="en-US" smtClean="0">
-                <a:latin typeface="Consolas" panose="020B0609020204030204" pitchFamily="49" charset="0"/>
-              </a:rPr>
-              <a:t>]; // </a:t>
-            </a:r>
-            <a:r>
-              <a:rPr lang="en-US">
-                <a:latin typeface="Consolas" panose="020B0609020204030204" pitchFamily="49" charset="0"/>
-                <a:sym typeface="Symbol" panose="05050102010706020507" pitchFamily="18" charset="2"/>
-              </a:rPr>
-              <a:t> </a:t>
-            </a:r>
-            <a:r>
-              <a:rPr lang="en-US" smtClean="0">
-                <a:latin typeface="Consolas" panose="020B0609020204030204" pitchFamily="49" charset="0"/>
-                <a:sym typeface="Symbol" panose="05050102010706020507" pitchFamily="18" charset="2"/>
-              </a:rPr>
-              <a:t>int val</a:t>
-            </a:r>
-            <a:r>
-              <a:rPr lang="en-US">
-                <a:latin typeface="Consolas" panose="020B0609020204030204" pitchFamily="49" charset="0"/>
-              </a:rPr>
-              <a:t/>
-            </a:r>
-            <a:br>
-              <a:rPr lang="en-US">
-                <a:latin typeface="Consolas" panose="020B0609020204030204" pitchFamily="49" charset="0"/>
-              </a:rPr>
-            </a:br>
-            <a:r>
-              <a:rPr lang="en-US" smtClean="0">
-                <a:latin typeface="Consolas" panose="020B0609020204030204" pitchFamily="49" charset="0"/>
-              </a:rPr>
               <a:t>  return </a:t>
             </a:r>
             <a:r>
               <a:rPr lang="en-US">
                 <a:latin typeface="Consolas" panose="020B0609020204030204" pitchFamily="49" charset="0"/>
               </a:rPr>
-              <a:t>(</a:t>
-            </a:r>
-            <a:r>
-              <a:rPr lang="en-US">
-                <a:latin typeface="Consolas" panose="020B0609020204030204" pitchFamily="49" charset="0"/>
-              </a:rPr>
-              <a:t>val</a:t>
+              <a:t>(val</a:t>
             </a:r>
             <a:r>
               <a:rPr lang="en-US" smtClean="0">
@@ -12154,11 +11991,7 @@
           <a:p>
             <a:r>
               <a:rPr lang="ru-RU"/>
-              <a:t>Функция к указателю </a:t>
-            </a:r>
-            <a:r>
-              <a:rPr lang="ru-RU"/>
-              <a:t>на </a:t>
+              <a:t>Функция к указателю на </a:t>
             </a:r>
             <a:r>
               <a:rPr lang="ru-RU" smtClean="0"/>
@@ -12279,13 +12112,7 @@
               <a:rPr lang="en-US">
                 <a:latin typeface="Consolas" panose="020B0609020204030204" pitchFamily="49" charset="0"/>
               </a:rPr>
-              <a:t>const int </a:t>
-            </a:r>
-            <a:r>
-              <a:rPr lang="en-US">
-                <a:latin typeface="Consolas" panose="020B0609020204030204" pitchFamily="49" charset="0"/>
-              </a:rPr>
-              <a:t>&amp;</a:t>
+              <a:t>const int &amp;</a:t>
             </a:r>
             <a:r>
               <a:rPr lang="en-US" smtClean="0">
@@ -12574,13 +12401,7 @@
               <a:rPr lang="en-US">
                 <a:latin typeface="Consolas" panose="020B0609020204030204" pitchFamily="49" charset="0"/>
               </a:rPr>
-              <a:t> </a:t>
-            </a:r>
-            <a:r>
-              <a:rPr lang="en-US">
-                <a:latin typeface="Consolas" panose="020B0609020204030204" pitchFamily="49" charset="0"/>
-              </a:rPr>
-              <a:t>to </a:t>
+              <a:t> to </a:t>
             </a:r>
             <a:r>
               <a:rPr lang="en-US" smtClean="0">
@@ -12686,13 +12507,7 @@
               <a:rPr lang="en-US">
                 <a:latin typeface="Consolas" panose="020B0609020204030204" pitchFamily="49" charset="0"/>
               </a:rPr>
-              <a:t>&lt;decltype(x)&gt; </a:t>
-            </a:r>
-            <a:r>
-              <a:rPr lang="en-US">
-                <a:latin typeface="Consolas" panose="020B0609020204030204" pitchFamily="49" charset="0"/>
-              </a:rPr>
-              <a:t>y</a:t>
+              <a:t>&lt;decltype(x)&gt; y</a:t>
             </a:r>
             <a:r>
               <a:rPr lang="en-US" smtClean="0">
@@ -12704,13 +12519,7 @@
               <a:rPr lang="en-US">
                 <a:latin typeface="Consolas" panose="020B0609020204030204" pitchFamily="49" charset="0"/>
               </a:rPr>
-              <a:t>decltype(x</a:t>
-            </a:r>
-            <a:r>
-              <a:rPr lang="en-US">
-                <a:latin typeface="Consolas" panose="020B0609020204030204" pitchFamily="49" charset="0"/>
-              </a:rPr>
-              <a:t>) </a:t>
+              <a:t>decltype(x) </a:t>
             </a:r>
             <a:r>
               <a:rPr lang="en-US" smtClean="0">
@@ -13208,13 +13017,7 @@
               <a:rPr lang="fr-FR">
                 <a:latin typeface="Consolas" panose="020B0609020204030204" pitchFamily="49" charset="0"/>
               </a:rPr>
-              <a:t>template &lt;class T1, </a:t>
-            </a:r>
-            <a:r>
-              <a:rPr lang="fr-FR">
-                <a:latin typeface="Consolas" panose="020B0609020204030204" pitchFamily="49" charset="0"/>
-              </a:rPr>
-              <a:t>class </a:t>
+              <a:t>template &lt;class T1, class </a:t>
             </a:r>
             <a:r>
               <a:rPr lang="fr-FR" smtClean="0">
@@ -13237,13 +13040,7 @@
               <a:rPr lang="fr-FR">
                 <a:latin typeface="Consolas" panose="020B0609020204030204" pitchFamily="49" charset="0"/>
               </a:rPr>
-              <a:t>common_type&lt;T1, T2&gt; </a:t>
-            </a:r>
-            <a:r>
-              <a:rPr lang="fr-FR">
-                <a:latin typeface="Consolas" panose="020B0609020204030204" pitchFamily="49" charset="0"/>
-              </a:rPr>
-              <a:t>: </a:t>
+              <a:t>common_type&lt;T1, T2&gt; : </a:t>
             </a:r>
             <a:r>
               <a:rPr lang="fr-FR" smtClean="0">
@@ -13266,13 +13063,7 @@
               <a:rPr lang="fr-FR">
                 <a:latin typeface="Consolas" panose="020B0609020204030204" pitchFamily="49" charset="0"/>
               </a:rPr>
-              <a:t>&gt;, decay_t&lt;T2&gt;&gt; </a:t>
-            </a:r>
-            <a:r>
-              <a:rPr lang="fr-FR">
-                <a:latin typeface="Consolas" panose="020B0609020204030204" pitchFamily="49" charset="0"/>
-              </a:rPr>
-              <a:t>{ </a:t>
+              <a:t>&gt;, decay_t&lt;T2&gt;&gt; { </a:t>
             </a:r>
             <a:r>
               <a:rPr lang="fr-FR" smtClean="0">
@@ -13303,13 +13094,7 @@
               <a:rPr lang="en-US">
                 <a:latin typeface="Consolas" panose="020B0609020204030204" pitchFamily="49" charset="0"/>
               </a:rPr>
-              <a:t>template &lt;class T, class U&gt; </a:t>
-            </a:r>
-            <a:r>
-              <a:rPr lang="en-US">
-                <a:latin typeface="Consolas" panose="020B0609020204030204" pitchFamily="49" charset="0"/>
-              </a:rPr>
-              <a:t>struct </a:t>
+              <a:t>template &lt;class T, class U&gt; struct </a:t>
             </a:r>
             <a:r>
               <a:rPr lang="en-US" smtClean="0">
@@ -13338,13 +13123,7 @@
               <a:rPr lang="en-US">
                 <a:latin typeface="Consolas" panose="020B0609020204030204" pitchFamily="49" charset="0"/>
               </a:rPr>
-              <a:t>typedef decay_t &lt; decltype(true </a:t>
-            </a:r>
-            <a:r>
-              <a:rPr lang="en-US">
-                <a:latin typeface="Consolas" panose="020B0609020204030204" pitchFamily="49" charset="0"/>
-              </a:rPr>
-              <a:t>? </a:t>
+              <a:t>typedef decay_t &lt; decltype(true ? </a:t>
             </a:r>
             <a:r>
               <a:rPr lang="en-US" smtClean="0">
@@ -13368,13 +13147,7 @@
               <a:rPr lang="en-US">
                 <a:latin typeface="Consolas" panose="020B0609020204030204" pitchFamily="49" charset="0"/>
               </a:rPr>
-              <a:t>&gt; </a:t>
-            </a:r>
-            <a:r>
-              <a:rPr lang="en-US">
-                <a:latin typeface="Consolas" panose="020B0609020204030204" pitchFamily="49" charset="0"/>
-              </a:rPr>
-              <a:t>type</a:t>
+              <a:t>&gt; type</a:t>
             </a:r>
             <a:r>
               <a:rPr lang="en-US" smtClean="0">
@@ -13530,13 +13303,7 @@
               <a:rPr lang="en-US">
                 <a:latin typeface="Consolas" panose="020B0609020204030204" pitchFamily="49" charset="0"/>
               </a:rPr>
-              <a:t>    typedef decay_t </a:t>
-            </a:r>
-            <a:r>
-              <a:rPr lang="en-US">
-                <a:latin typeface="Consolas" panose="020B0609020204030204" pitchFamily="49" charset="0"/>
-              </a:rPr>
-              <a:t>&lt; </a:t>
+              <a:t>    typedef decay_t &lt; </a:t>
             </a:r>
             <a:r>
               <a:rPr lang="en-US" smtClean="0">
@@ -13827,13 +13594,7 @@
               <a:rPr lang="en-US">
                 <a:latin typeface="Consolas" panose="020B0609020204030204" pitchFamily="49" charset="0"/>
               </a:rPr>
-              <a:t>void foo (T *const &amp; t</a:t>
-            </a:r>
-            <a:r>
-              <a:rPr lang="en-US">
-                <a:latin typeface="Consolas" panose="020B0609020204030204" pitchFamily="49" charset="0"/>
-              </a:rPr>
-              <a:t>) </a:t>
+              <a:t>void foo (T *const &amp; t) </a:t>
             </a:r>
             <a:r>
               <a:rPr lang="en-US" smtClean="0">
@@ -13856,19 +13617,7 @@
               <a:rPr lang="en-US">
                 <a:latin typeface="Consolas" panose="020B0609020204030204" pitchFamily="49" charset="0"/>
               </a:rPr>
-              <a:t>cout &lt;&lt; typeid(t).name() &lt;&lt; endl</a:t>
-            </a:r>
-            <a:r>
-              <a:rPr lang="en-US">
-                <a:latin typeface="Consolas" panose="020B0609020204030204" pitchFamily="49" charset="0"/>
-              </a:rPr>
-              <a:t>;</a:t>
-            </a:r>
-            <a:r>
-              <a:rPr lang="en-US">
-                <a:latin typeface="Consolas" panose="020B0609020204030204" pitchFamily="49" charset="0"/>
-              </a:rPr>
-              <a:t> </a:t>
+              <a:t>cout &lt;&lt; typeid(t).name() &lt;&lt; endl; </a:t>
             </a:r>
             <a:r>
               <a:rPr lang="ru-RU">
@@ -14057,13 +13806,7 @@
               <a:rPr lang="en-US">
                 <a:latin typeface="Consolas" panose="020B0609020204030204" pitchFamily="49" charset="0"/>
               </a:rPr>
-              <a:t>x </a:t>
-            </a:r>
-            <a:r>
-              <a:rPr lang="en-US">
-                <a:latin typeface="Consolas" panose="020B0609020204030204" pitchFamily="49" charset="0"/>
-              </a:rPr>
-              <a:t>= </a:t>
+              <a:t>x = </a:t>
             </a:r>
             <a:r>
               <a:rPr lang="en-US" smtClean="0">
@@ -14089,13 +13832,7 @@
               <a:rPr lang="en-US">
                 <a:latin typeface="Consolas" panose="020B0609020204030204" pitchFamily="49" charset="0"/>
               </a:rPr>
-              <a:t>(&amp;</a:t>
-            </a:r>
-            <a:r>
-              <a:rPr lang="en-US">
-                <a:latin typeface="Consolas" panose="020B0609020204030204" pitchFamily="49" charset="0"/>
-              </a:rPr>
-              <a:t>x</a:t>
+              <a:t>(&amp;x</a:t>
             </a:r>
             <a:r>
               <a:rPr lang="en-US" smtClean="0">
@@ -14140,15 +13877,7 @@
                   <a:srgbClr val="FF0000"/>
                 </a:solidFill>
               </a:rPr>
-              <a:t>reference to `void foo&lt;int&gt;(int* </a:t>
-            </a:r>
-            <a:r>
-              <a:rPr lang="en-US">
-                <a:solidFill>
-                  <a:srgbClr val="FF0000"/>
-                </a:solidFill>
-              </a:rPr>
-              <a:t>const</a:t>
+              <a:t>reference to `void foo&lt;int&gt;(int* const</a:t>
             </a:r>
             <a:r>
               <a:rPr lang="en-US" smtClean="0">
@@ -14291,13 +14020,7 @@
               <a:rPr lang="en-US">
                 <a:latin typeface="Consolas" panose="020B0609020204030204" pitchFamily="49" charset="0"/>
               </a:rPr>
-              <a:t>template &lt;</a:t>
-            </a:r>
-            <a:r>
-              <a:rPr lang="en-US">
-                <a:latin typeface="Consolas" panose="020B0609020204030204" pitchFamily="49" charset="0"/>
-              </a:rPr>
-              <a:t>typename </a:t>
+              <a:t>template &lt;typename </a:t>
             </a:r>
             <a:r>
               <a:rPr lang="en-US" smtClean="0">
@@ -14321,13 +14044,7 @@
               <a:rPr lang="en-US">
                 <a:latin typeface="Consolas" panose="020B0609020204030204" pitchFamily="49" charset="0"/>
               </a:rPr>
-              <a:t>foo (T *const &amp; t</a:t>
-            </a:r>
-            <a:r>
-              <a:rPr lang="en-US">
-                <a:latin typeface="Consolas" panose="020B0609020204030204" pitchFamily="49" charset="0"/>
-              </a:rPr>
-              <a:t>) </a:t>
+              <a:t>foo (T *const &amp; t) </a:t>
             </a:r>
             <a:r>
               <a:rPr lang="en-US" smtClean="0">
@@ -14395,87 +14112,81 @@
                   <a:srgbClr val="FF0000"/>
                 </a:solidFill>
               </a:rPr>
-              <a:t>&gt; tType’ has </a:t>
-            </a:r>
-            <a:r>
-              <a:rPr lang="en-US">
+              <a:t>&gt; tType’ has incomplete </a:t>
+            </a:r>
+            <a:r>
+              <a:rPr lang="en-US" smtClean="0">
                 <a:solidFill>
                   <a:srgbClr val="FF0000"/>
                 </a:solidFill>
               </a:rPr>
-              <a:t>incomplete </a:t>
-            </a:r>
-            <a:r>
-              <a:rPr lang="en-US" smtClean="0">
+              <a:t>type</a:t>
+            </a:r>
+            <a:r>
+              <a:rPr lang="ru-RU" smtClean="0">
                 <a:solidFill>
                   <a:srgbClr val="FF0000"/>
                 </a:solidFill>
               </a:rPr>
-              <a:t>type</a:t>
-            </a:r>
-            <a:r>
+              <a:t/>
+            </a:r>
+            <a:br>
               <a:rPr lang="ru-RU" smtClean="0">
                 <a:solidFill>
                   <a:srgbClr val="FF0000"/>
                 </a:solidFill>
               </a:rPr>
-              <a:t/>
-            </a:r>
-            <a:br>
-              <a:rPr lang="ru-RU" smtClean="0">
+            </a:br>
+            <a:r>
+              <a:rPr lang="ru-RU" smtClean="0">
+                <a:latin typeface="Consolas" panose="020B0609020204030204" pitchFamily="49" charset="0"/>
+              </a:rPr>
+              <a:t>  </a:t>
+            </a:r>
+            <a:r>
+              <a:rPr lang="en-US" smtClean="0">
+                <a:latin typeface="Consolas" panose="020B0609020204030204" pitchFamily="49" charset="0"/>
+              </a:rPr>
+              <a:t>TD&lt;t</a:t>
+            </a:r>
+            <a:r>
+              <a:rPr lang="en-US">
+                <a:latin typeface="Consolas" panose="020B0609020204030204" pitchFamily="49" charset="0"/>
+              </a:rPr>
+              <a:t>&gt; tParam; </a:t>
+            </a:r>
+            <a:r>
+              <a:rPr lang="en-US" smtClean="0">
                 <a:solidFill>
                   <a:srgbClr val="FF0000"/>
                 </a:solidFill>
-              </a:rPr>
-            </a:br>
-            <a:r>
-              <a:rPr lang="ru-RU" smtClean="0">
-                <a:latin typeface="Consolas" panose="020B0609020204030204" pitchFamily="49" charset="0"/>
-              </a:rPr>
-              <a:t>  </a:t>
-            </a:r>
-            <a:r>
-              <a:rPr lang="en-US" smtClean="0">
-                <a:latin typeface="Consolas" panose="020B0609020204030204" pitchFamily="49" charset="0"/>
-              </a:rPr>
-              <a:t>TD&lt;t</a:t>
-            </a:r>
-            <a:r>
-              <a:rPr lang="en-US">
-                <a:latin typeface="Consolas" panose="020B0609020204030204" pitchFamily="49" charset="0"/>
-              </a:rPr>
-              <a:t>&gt; tParam</a:t>
-            </a:r>
-            <a:r>
-              <a:rPr lang="en-US">
-                <a:latin typeface="Consolas" panose="020B0609020204030204" pitchFamily="49" charset="0"/>
-              </a:rPr>
-              <a:t>; </a:t>
+                <a:latin typeface="Consolas" panose="020B0609020204030204" pitchFamily="49" charset="0"/>
+              </a:rPr>
+              <a:t>//</a:t>
             </a:r>
             <a:r>
               <a:rPr lang="en-US" smtClean="0">
                 <a:solidFill>
                   <a:srgbClr val="FF0000"/>
                 </a:solidFill>
-                <a:latin typeface="Consolas" panose="020B0609020204030204" pitchFamily="49" charset="0"/>
-              </a:rPr>
-              <a:t>//</a:t>
-            </a:r>
-            <a:r>
-              <a:rPr lang="en-US" smtClean="0">
+              </a:rPr>
+              <a:t> </a:t>
+            </a:r>
+            <a:r>
+              <a:rPr lang="en-US">
                 <a:solidFill>
                   <a:srgbClr val="FF0000"/>
                 </a:solidFill>
               </a:rPr>
-              <a:t> </a:t>
-            </a:r>
-            <a:r>
-              <a:rPr lang="en-US">
+              <a:t>error: </a:t>
+            </a:r>
+            <a:r>
+              <a:rPr lang="en-US" smtClean="0">
                 <a:solidFill>
                   <a:srgbClr val="FF0000"/>
                 </a:solidFill>
               </a:rPr>
-              <a:t>error</a:t>
+              <a:t> ‘TD&lt;int</a:t>
             </a:r>
             <a:r>
               <a:rPr lang="en-US">
@@ -14483,31 +14194,7 @@
                   <a:srgbClr val="FF0000"/>
                 </a:solidFill>
               </a:rPr>
-              <a:t>: </a:t>
-            </a:r>
-            <a:r>
-              <a:rPr lang="en-US" smtClean="0">
-                <a:solidFill>
-                  <a:srgbClr val="FF0000"/>
-                </a:solidFill>
-              </a:rPr>
-              <a:t> ‘TD&lt;int</a:t>
-            </a:r>
-            <a:r>
-              <a:rPr lang="en-US">
-                <a:solidFill>
-                  <a:srgbClr val="FF0000"/>
-                </a:solidFill>
-              </a:rPr>
-              <a:t>* const&amp;&gt; tParam’ has </a:t>
-            </a:r>
-            <a:r>
-              <a:rPr lang="en-US">
-                <a:solidFill>
-                  <a:srgbClr val="FF0000"/>
-                </a:solidFill>
-              </a:rPr>
-              <a:t>incomplete </a:t>
+              <a:t>* const&amp;&gt; tParam’ has incomplete </a:t>
             </a:r>
             <a:r>
               <a:rPr lang="en-US" smtClean="0">
@@ -14733,13 +14420,7 @@
               <a:rPr lang="en-US">
                 <a:latin typeface="Consolas" panose="020B0609020204030204" pitchFamily="49" charset="0"/>
               </a:rPr>
-              <a:t>int *z = </a:t>
-            </a:r>
-            <a:r>
-              <a:rPr lang="en-US">
-                <a:latin typeface="Consolas" panose="020B0609020204030204" pitchFamily="49" charset="0"/>
-              </a:rPr>
-              <a:t>&amp;</a:t>
+              <a:t>int *z = &amp;</a:t>
             </a:r>
             <a:r>
               <a:rPr lang="en-US" smtClean="0">
@@ -14768,13 +14449,7 @@
               <a:rPr lang="en-US">
                 <a:latin typeface="Consolas" panose="020B0609020204030204" pitchFamily="49" charset="0"/>
               </a:rPr>
-              <a:t>t </a:t>
-            </a:r>
-            <a:r>
-              <a:rPr lang="en-US">
-                <a:latin typeface="Consolas" panose="020B0609020204030204" pitchFamily="49" charset="0"/>
-              </a:rPr>
-              <a:t>= </a:t>
+              <a:t>t = </a:t>
             </a:r>
             <a:r>
               <a:rPr lang="en-US" smtClean="0">
@@ -14803,13 +14478,7 @@
               <a:rPr lang="en-US">
                 <a:latin typeface="Consolas" panose="020B0609020204030204" pitchFamily="49" charset="0"/>
               </a:rPr>
-              <a:t>)&gt; </a:t>
-            </a:r>
-            <a:r>
-              <a:rPr lang="en-US">
-                <a:latin typeface="Consolas" panose="020B0609020204030204" pitchFamily="49" charset="0"/>
-              </a:rPr>
-              <a:t>tType</a:t>
+              <a:t>)&gt; tType</a:t>
             </a:r>
             <a:r>
               <a:rPr lang="en-US" smtClean="0">
@@ -14832,39 +14501,23 @@
                   <a:srgbClr val="FF0000"/>
                 </a:solidFill>
               </a:rPr>
-              <a:t>error</a:t>
-            </a:r>
-            <a:r>
-              <a:rPr lang="en-US">
+              <a:t>error: </a:t>
+            </a:r>
+            <a:r>
+              <a:rPr lang="en-US" smtClean="0">
                 <a:solidFill>
                   <a:srgbClr val="FF0000"/>
                 </a:solidFill>
               </a:rPr>
-              <a:t>: </a:t>
-            </a:r>
-            <a:r>
-              <a:rPr lang="en-US" smtClean="0">
+              <a:t>‘</a:t>
+            </a:r>
+            <a:r>
+              <a:rPr lang="en-US">
                 <a:solidFill>
                   <a:srgbClr val="FF0000"/>
                 </a:solidFill>
               </a:rPr>
-              <a:t>‘</a:t>
-            </a:r>
-            <a:r>
-              <a:rPr lang="en-US">
-                <a:solidFill>
-                  <a:srgbClr val="FF0000"/>
-                </a:solidFill>
-              </a:rPr>
-              <a:t>TD&lt;const int</a:t>
-            </a:r>
-            <a:r>
-              <a:rPr lang="en-US">
-                <a:solidFill>
-                  <a:srgbClr val="FF0000"/>
-                </a:solidFill>
-              </a:rPr>
-              <a:t>*&gt; </a:t>
+              <a:t>TD&lt;const int*&gt; </a:t>
             </a:r>
             <a:r>
               <a:rPr lang="en-US" smtClean="0">
@@ -15105,13 +14758,7 @@
               <a:rPr lang="en-US">
                 <a:latin typeface="Consolas" panose="020B0609020204030204" pitchFamily="49" charset="0"/>
               </a:rPr>
-              <a:t>boost::typeindex</a:t>
-            </a:r>
-            <a:r>
-              <a:rPr lang="en-US">
-                <a:latin typeface="Consolas" panose="020B0609020204030204" pitchFamily="49" charset="0"/>
-              </a:rPr>
-              <a:t>::</a:t>
+              <a:t>boost::typeindex::</a:t>
             </a:r>
             <a:r>
               <a:rPr lang="en-US" smtClean="0">
@@ -15134,13 +14781,7 @@
               <a:rPr lang="en-US">
                 <a:latin typeface="Consolas" panose="020B0609020204030204" pitchFamily="49" charset="0"/>
               </a:rPr>
-              <a:t>&lt;typename T</a:t>
-            </a:r>
-            <a:r>
-              <a:rPr lang="en-US">
-                <a:latin typeface="Consolas" panose="020B0609020204030204" pitchFamily="49" charset="0"/>
-              </a:rPr>
-              <a:t>&gt; </a:t>
+              <a:t>&lt;typename T&gt; </a:t>
             </a:r>
             <a:r>
               <a:rPr lang="en-US" smtClean="0">
@@ -15178,12 +14819,6 @@
               </a:rPr>
               <a:t>{</a:t>
             </a:r>
-            <a:r>
-              <a:rPr lang="en-US">
-                <a:latin typeface="Consolas" panose="020B0609020204030204" pitchFamily="49" charset="0"/>
-              </a:rPr>
-              <a:t/>
-            </a:r>
             <a:br>
               <a:rPr lang="en-US">
                 <a:latin typeface="Consolas" panose="020B0609020204030204" pitchFamily="49" charset="0"/>
@@ -15231,12 +14866,6 @@
               </a:rPr>
               <a:t>)&gt;.pretty_name();</a:t>
             </a:r>
-            <a:r>
-              <a:rPr lang="en-US">
-                <a:latin typeface="Consolas" panose="020B0609020204030204" pitchFamily="49" charset="0"/>
-              </a:rPr>
-              <a:t/>
-            </a:r>
             <a:br>
               <a:rPr lang="en-US">
                 <a:latin typeface="Consolas" panose="020B0609020204030204" pitchFamily="49" charset="0"/>
@@ -15259,12 +14888,6 @@
                 <a:latin typeface="Consolas" panose="020B0609020204030204" pitchFamily="49" charset="0"/>
               </a:rPr>
               <a:t>&lt;&lt; namestr &lt;&lt; endl;</a:t>
-            </a:r>
-            <a:r>
-              <a:rPr lang="en-US">
-                <a:latin typeface="Consolas" panose="020B0609020204030204" pitchFamily="49" charset="0"/>
-              </a:rPr>
-              <a:t/>
             </a:r>
             <a:br>
               <a:rPr lang="en-US">
@@ -15418,13 +15041,7 @@
               <a:rPr lang="en-US">
                 <a:latin typeface="Consolas" panose="020B0609020204030204" pitchFamily="49" charset="0"/>
               </a:rPr>
-              <a:t>C++</a:t>
-            </a:r>
-            <a:r>
-              <a:rPr lang="en-US">
-                <a:latin typeface="Consolas" panose="020B0609020204030204" pitchFamily="49" charset="0"/>
-              </a:rPr>
-              <a:t>0x </a:t>
+              <a:t>C++0x </a:t>
             </a:r>
             <a:r>
               <a:rPr lang="en-US" smtClean="0">
@@ -15445,11 +15062,7 @@
             </a:r>
             <a:r>
               <a:rPr lang="en-US"/>
-              <a:t>Thomas Becker "C++ auto </a:t>
-            </a:r>
-            <a:r>
-              <a:rPr lang="en-US"/>
-              <a:t>and </a:t>
+              <a:t>Thomas Becker "C++ auto and </a:t>
             </a:r>
             <a:r>
               <a:rPr lang="en-US" smtClean="0"/>
@@ -15463,11 +15076,7 @@
             </a:r>
             <a:r>
               <a:rPr lang="en-US"/>
-              <a:t>Scott Meyers</a:t>
-            </a:r>
-            <a:r>
-              <a:rPr lang="en-US"/>
-              <a:t>, </a:t>
+              <a:t>Scott Meyers, </a:t>
             </a:r>
             <a:r>
               <a:rPr lang="en-US" smtClean="0"/>
@@ -15475,11 +15084,7 @@
             </a:r>
             <a:r>
               <a:rPr lang="en-US"/>
-              <a:t>Modern C++: </a:t>
-            </a:r>
-            <a:r>
-              <a:rPr lang="en-US"/>
-              <a:t>42 </a:t>
+              <a:t>Modern C++: 42 </a:t>
             </a:r>
             <a:r>
               <a:rPr lang="en-US" smtClean="0"/>
@@ -15487,19 +15092,11 @@
             </a:r>
             <a:r>
               <a:rPr lang="en-US"/>
-              <a:t>to Improve Your Use of C++11 and C++</a:t>
-            </a:r>
-            <a:r>
-              <a:rPr lang="en-US"/>
-              <a:t>14</a:t>
+              <a:t>to Improve Your Use of C++11 and C++14</a:t>
             </a:r>
             <a:r>
               <a:rPr lang="en-US" smtClean="0"/>
-              <a:t>”</a:t>
-            </a:r>
-            <a:r>
-              <a:rPr lang="en-US" smtClean="0"/>
-              <a:t>"</a:t>
+              <a:t>”"</a:t>
             </a:r>
             <a:endParaRPr lang="en-US"/>
           </a:p>
@@ -15510,11 +15107,7 @@
             </a:r>
             <a:r>
               <a:rPr lang="en-US"/>
-              <a:t>Meyers "Type Deduction and Why You </a:t>
-            </a:r>
-            <a:r>
-              <a:rPr lang="en-US"/>
-              <a:t>Care</a:t>
+              <a:t>Meyers "Type Deduction and Why You Care</a:t>
             </a:r>
             <a:r>
               <a:rPr lang="en-US" smtClean="0"/>
@@ -15699,25 +15292,19 @@
               <a:rPr lang="en-US" sz="2400" smtClean="0">
                 <a:latin typeface="Consolas" panose="020B0609020204030204" pitchFamily="49" charset="0"/>
               </a:rPr>
-              <a:t>int *px = &amp;x; // </a:t>
-            </a:r>
-            <a:r>
-              <a:rPr lang="ru-RU" sz="2400" smtClean="0">
-                <a:latin typeface="Consolas" panose="020B0609020204030204" pitchFamily="49" charset="0"/>
-              </a:rPr>
-              <a:t>подразумевается </a:t>
+              <a:t>int x = 42; int </a:t>
             </a:r>
             <a:r>
               <a:rPr lang="en-US" sz="2400" smtClean="0">
                 <a:latin typeface="Consolas" panose="020B0609020204030204" pitchFamily="49" charset="0"/>
               </a:rPr>
-              <a:t>int x </a:t>
-            </a:r>
-            <a:r>
-              <a:rPr lang="ru-RU" sz="2400" smtClean="0">
-                <a:latin typeface="Consolas" panose="020B0609020204030204" pitchFamily="49" charset="0"/>
-              </a:rPr>
-              <a:t>выше</a:t>
+              <a:t>*px = &amp;x</a:t>
+            </a:r>
+            <a:r>
+              <a:rPr lang="en-US" sz="2400" smtClean="0">
+                <a:latin typeface="Consolas" panose="020B0609020204030204" pitchFamily="49" charset="0"/>
+              </a:rPr>
+              <a:t>;</a:t>
             </a:r>
             <a:r>
               <a:rPr lang="en-US" sz="2400" smtClean="0">
@@ -15983,20 +15570,22 @@
         </p:nvSpPr>
         <p:spPr/>
         <p:txBody>
-          <a:bodyPr/>
+          <a:bodyPr>
+            <a:normAutofit/>
+          </a:bodyPr>
           <a:lstStyle/>
           <a:p>
             <a:pPr marL="45720" indent="0">
               <a:buNone/>
             </a:pPr>
             <a:r>
-              <a:rPr lang="en-US" sz="2000">
+              <a:rPr lang="en-US">
                 <a:latin typeface="Consolas" panose="020B0609020204030204" pitchFamily="49" charset="0"/>
               </a:rPr>
               <a:t>template &lt;typename T&gt; void foo (</a:t>
             </a:r>
             <a:r>
-              <a:rPr lang="en-US" sz="2000" smtClean="0">
+              <a:rPr lang="en-US" smtClean="0">
                 <a:solidFill>
                   <a:srgbClr val="0000FF"/>
                 </a:solidFill>
@@ -16005,7 +15594,7 @@
               <a:t>T</a:t>
             </a:r>
             <a:r>
-              <a:rPr lang="en-US" sz="2000">
+              <a:rPr lang="en-US">
                 <a:solidFill>
                   <a:srgbClr val="0000FF"/>
                 </a:solidFill>
@@ -16014,7 +15603,7 @@
               <a:t> </a:t>
             </a:r>
             <a:r>
-              <a:rPr lang="en-US" sz="2000" smtClean="0">
+              <a:rPr lang="en-US" smtClean="0">
                 <a:solidFill>
                   <a:srgbClr val="0000FF"/>
                 </a:solidFill>
@@ -16023,19 +15612,19 @@
               <a:t>* const &amp;</a:t>
             </a:r>
             <a:r>
-              <a:rPr lang="en-US" sz="2000" smtClean="0">
+              <a:rPr lang="en-US" smtClean="0">
                 <a:latin typeface="Consolas" panose="020B0609020204030204" pitchFamily="49" charset="0"/>
               </a:rPr>
               <a:t> </a:t>
             </a:r>
             <a:r>
-              <a:rPr lang="en-US" sz="2000">
+              <a:rPr lang="en-US">
                 <a:latin typeface="Consolas" panose="020B0609020204030204" pitchFamily="49" charset="0"/>
               </a:rPr>
               <a:t>t</a:t>
             </a:r>
             <a:r>
-              <a:rPr lang="en-US" sz="2000" smtClean="0">
+              <a:rPr lang="en-US" smtClean="0">
                 <a:latin typeface="Consolas" panose="020B0609020204030204" pitchFamily="49" charset="0"/>
               </a:rPr>
               <a:t>);</a:t>
@@ -16046,29 +15635,29 @@
               <a:buNone/>
             </a:pPr>
             <a:r>
-              <a:rPr lang="en-US" sz="2000" smtClean="0">
+              <a:rPr lang="en-US" smtClean="0">
                 <a:latin typeface="Consolas" panose="020B0609020204030204" pitchFamily="49" charset="0"/>
               </a:rPr>
               <a:t>int x = 42;</a:t>
             </a:r>
             <a:br>
-              <a:rPr lang="en-US" sz="2000" smtClean="0">
+              <a:rPr lang="en-US" smtClean="0">
                 <a:latin typeface="Consolas" panose="020B0609020204030204" pitchFamily="49" charset="0"/>
               </a:rPr>
             </a:br>
             <a:r>
-              <a:rPr lang="en-US" sz="2000" smtClean="0">
+              <a:rPr lang="en-US" smtClean="0">
                 <a:latin typeface="Consolas" panose="020B0609020204030204" pitchFamily="49" charset="0"/>
               </a:rPr>
               <a:t>int const &amp;y = x;</a:t>
             </a:r>
             <a:br>
-              <a:rPr lang="en-US" sz="2000" smtClean="0">
+              <a:rPr lang="en-US" smtClean="0">
                 <a:latin typeface="Consolas" panose="020B0609020204030204" pitchFamily="49" charset="0"/>
               </a:rPr>
             </a:br>
             <a:r>
-              <a:rPr lang="en-US" sz="2000" smtClean="0">
+              <a:rPr lang="en-US" smtClean="0">
                 <a:latin typeface="Consolas" panose="020B0609020204030204" pitchFamily="49" charset="0"/>
               </a:rPr>
               <a:t>int const *z = &amp;x;</a:t>
@@ -16079,25 +15668,25 @@
               <a:buNone/>
             </a:pPr>
             <a:r>
-              <a:rPr lang="en-US" sz="2000" smtClean="0">
+              <a:rPr lang="en-US" smtClean="0">
                 <a:latin typeface="Consolas" panose="020B0609020204030204" pitchFamily="49" charset="0"/>
               </a:rPr>
               <a:t>foo (&amp;x); </a:t>
             </a:r>
             <a:r>
-              <a:rPr lang="en-US" sz="2000">
+              <a:rPr lang="en-US">
                 <a:latin typeface="Consolas" panose="020B0609020204030204" pitchFamily="49" charset="0"/>
               </a:rPr>
               <a:t>// </a:t>
             </a:r>
             <a:r>
-              <a:rPr lang="en-US" sz="2000" smtClean="0">
+              <a:rPr lang="en-US" smtClean="0">
                 <a:latin typeface="Consolas" panose="020B0609020204030204" pitchFamily="49" charset="0"/>
                 <a:sym typeface="Symbol" panose="05050102010706020507" pitchFamily="18" charset="2"/>
               </a:rPr>
               <a:t> ???</a:t>
             </a:r>
-            <a:endParaRPr lang="en-US" sz="2000" smtClean="0">
+            <a:endParaRPr lang="en-US" smtClean="0">
               <a:latin typeface="Consolas" panose="020B0609020204030204" pitchFamily="49" charset="0"/>
             </a:endParaRPr>
           </a:p>
@@ -16106,25 +15695,25 @@
               <a:buNone/>
             </a:pPr>
             <a:r>
-              <a:rPr lang="en-US" sz="2000" smtClean="0">
+              <a:rPr lang="en-US" smtClean="0">
                 <a:latin typeface="Consolas" panose="020B0609020204030204" pitchFamily="49" charset="0"/>
               </a:rPr>
               <a:t>foo (&amp;y);</a:t>
             </a:r>
             <a:r>
-              <a:rPr lang="en-US" sz="2000">
+              <a:rPr lang="en-US">
                 <a:latin typeface="Consolas" panose="020B0609020204030204" pitchFamily="49" charset="0"/>
               </a:rPr>
               <a:t> // </a:t>
             </a:r>
             <a:r>
-              <a:rPr lang="en-US" sz="2000" smtClean="0">
+              <a:rPr lang="en-US" smtClean="0">
                 <a:latin typeface="Consolas" panose="020B0609020204030204" pitchFamily="49" charset="0"/>
                 <a:sym typeface="Symbol" panose="05050102010706020507" pitchFamily="18" charset="2"/>
               </a:rPr>
               <a:t> ???</a:t>
             </a:r>
-            <a:endParaRPr lang="en-US" sz="2000" smtClean="0">
+            <a:endParaRPr lang="en-US" smtClean="0">
               <a:latin typeface="Consolas" panose="020B0609020204030204" pitchFamily="49" charset="0"/>
             </a:endParaRPr>
           </a:p>
@@ -16133,32 +15722,32 @@
               <a:buNone/>
             </a:pPr>
             <a:r>
-              <a:rPr lang="en-US" sz="2000" smtClean="0">
+              <a:rPr lang="en-US" smtClean="0">
                 <a:latin typeface="Consolas" panose="020B0609020204030204" pitchFamily="49" charset="0"/>
               </a:rPr>
               <a:t>foo (z);</a:t>
             </a:r>
             <a:r>
-              <a:rPr lang="en-US" sz="2000">
+              <a:rPr lang="en-US">
                 <a:latin typeface="Consolas" panose="020B0609020204030204" pitchFamily="49" charset="0"/>
               </a:rPr>
               <a:t> // </a:t>
             </a:r>
             <a:r>
-              <a:rPr lang="en-US" sz="2000" smtClean="0">
+              <a:rPr lang="en-US" smtClean="0">
                 <a:latin typeface="Consolas" panose="020B0609020204030204" pitchFamily="49" charset="0"/>
                 <a:sym typeface="Symbol" panose="05050102010706020507" pitchFamily="18" charset="2"/>
               </a:rPr>
               <a:t> ???</a:t>
             </a:r>
             <a:r>
-              <a:rPr lang="en-US" sz="2000">
+              <a:rPr lang="en-US">
                 <a:latin typeface="Consolas" panose="020B0609020204030204" pitchFamily="49" charset="0"/>
               </a:rPr>
               <a:t/>
             </a:r>
             <a:br>
-              <a:rPr lang="en-US" sz="2000">
+              <a:rPr lang="en-US">
                 <a:latin typeface="Consolas" panose="020B0609020204030204" pitchFamily="49" charset="0"/>
               </a:rPr>
             </a:br>
@@ -16231,20 +15820,22 @@
         </p:nvSpPr>
         <p:spPr/>
         <p:txBody>
-          <a:bodyPr/>
+          <a:bodyPr>
+            <a:normAutofit/>
+          </a:bodyPr>
           <a:lstStyle/>
           <a:p>
             <a:pPr marL="45720" indent="0">
               <a:buNone/>
             </a:pPr>
             <a:r>
-              <a:rPr lang="en-US" sz="2000">
+              <a:rPr lang="en-US">
                 <a:latin typeface="Consolas" panose="020B0609020204030204" pitchFamily="49" charset="0"/>
               </a:rPr>
               <a:t>template &lt;typename T&gt; void foo (</a:t>
             </a:r>
             <a:r>
-              <a:rPr lang="en-US" sz="2000" smtClean="0">
+              <a:rPr lang="en-US" smtClean="0">
                 <a:solidFill>
                   <a:srgbClr val="0000FF"/>
                 </a:solidFill>
@@ -16253,7 +15844,7 @@
               <a:t>T</a:t>
             </a:r>
             <a:r>
-              <a:rPr lang="en-US" sz="2000">
+              <a:rPr lang="en-US">
                 <a:solidFill>
                   <a:srgbClr val="0000FF"/>
                 </a:solidFill>
@@ -16262,7 +15853,7 @@
               <a:t> </a:t>
             </a:r>
             <a:r>
-              <a:rPr lang="en-US" sz="2000" smtClean="0">
+              <a:rPr lang="en-US" smtClean="0">
                 <a:solidFill>
                   <a:srgbClr val="0000FF"/>
                 </a:solidFill>
@@ -16271,19 +15862,19 @@
               <a:t>* const &amp;</a:t>
             </a:r>
             <a:r>
-              <a:rPr lang="en-US" sz="2000" smtClean="0">
+              <a:rPr lang="en-US" smtClean="0">
                 <a:latin typeface="Consolas" panose="020B0609020204030204" pitchFamily="49" charset="0"/>
               </a:rPr>
               <a:t> </a:t>
             </a:r>
             <a:r>
-              <a:rPr lang="en-US" sz="2000">
+              <a:rPr lang="en-US">
                 <a:latin typeface="Consolas" panose="020B0609020204030204" pitchFamily="49" charset="0"/>
               </a:rPr>
               <a:t>t</a:t>
             </a:r>
             <a:r>
-              <a:rPr lang="en-US" sz="2000" smtClean="0">
+              <a:rPr lang="en-US" smtClean="0">
                 <a:latin typeface="Consolas" panose="020B0609020204030204" pitchFamily="49" charset="0"/>
               </a:rPr>
               <a:t>);</a:t>
@@ -16294,29 +15885,29 @@
               <a:buNone/>
             </a:pPr>
             <a:r>
-              <a:rPr lang="en-US" sz="2000" smtClean="0">
+              <a:rPr lang="en-US" smtClean="0">
                 <a:latin typeface="Consolas" panose="020B0609020204030204" pitchFamily="49" charset="0"/>
               </a:rPr>
               <a:t>int x = 42;</a:t>
             </a:r>
             <a:br>
-              <a:rPr lang="en-US" sz="2000" smtClean="0">
+              <a:rPr lang="en-US" smtClean="0">
                 <a:latin typeface="Consolas" panose="020B0609020204030204" pitchFamily="49" charset="0"/>
               </a:rPr>
             </a:br>
             <a:r>
-              <a:rPr lang="en-US" sz="2000" smtClean="0">
+              <a:rPr lang="en-US" smtClean="0">
                 <a:latin typeface="Consolas" panose="020B0609020204030204" pitchFamily="49" charset="0"/>
               </a:rPr>
               <a:t>int const &amp;y = x;</a:t>
             </a:r>
             <a:br>
-              <a:rPr lang="en-US" sz="2000" smtClean="0">
+              <a:rPr lang="en-US" smtClean="0">
                 <a:latin typeface="Consolas" panose="020B0609020204030204" pitchFamily="49" charset="0"/>
               </a:rPr>
             </a:br>
             <a:r>
-              <a:rPr lang="en-US" sz="2000" smtClean="0">
+              <a:rPr lang="en-US" smtClean="0">
                 <a:latin typeface="Consolas" panose="020B0609020204030204" pitchFamily="49" charset="0"/>
               </a:rPr>
               <a:t>int const *z = &amp;x;</a:t>
@@ -16327,25 +15918,25 @@
               <a:buNone/>
             </a:pPr>
             <a:r>
-              <a:rPr lang="en-US" sz="2000" smtClean="0">
+              <a:rPr lang="en-US" smtClean="0">
                 <a:latin typeface="Consolas" panose="020B0609020204030204" pitchFamily="49" charset="0"/>
               </a:rPr>
               <a:t>foo (&amp;x); </a:t>
             </a:r>
             <a:r>
-              <a:rPr lang="en-US" sz="2000">
+              <a:rPr lang="en-US">
                 <a:latin typeface="Consolas" panose="020B0609020204030204" pitchFamily="49" charset="0"/>
               </a:rPr>
               <a:t>// </a:t>
             </a:r>
             <a:r>
-              <a:rPr lang="en-US" sz="2000" smtClean="0">
+              <a:rPr lang="en-US" smtClean="0">
                 <a:latin typeface="Consolas" panose="020B0609020204030204" pitchFamily="49" charset="0"/>
                 <a:sym typeface="Symbol" panose="05050102010706020507" pitchFamily="18" charset="2"/>
               </a:rPr>
               <a:t> foo&lt;int&gt;(int * const &amp;)</a:t>
             </a:r>
-            <a:endParaRPr lang="en-US" sz="2000" smtClean="0">
+            <a:endParaRPr lang="en-US" smtClean="0">
               <a:latin typeface="Consolas" panose="020B0609020204030204" pitchFamily="49" charset="0"/>
             </a:endParaRPr>
           </a:p>
@@ -16354,25 +15945,25 @@
               <a:buNone/>
             </a:pPr>
             <a:r>
-              <a:rPr lang="en-US" sz="2000" smtClean="0">
+              <a:rPr lang="en-US" smtClean="0">
                 <a:latin typeface="Consolas" panose="020B0609020204030204" pitchFamily="49" charset="0"/>
               </a:rPr>
               <a:t>foo (&amp;y);</a:t>
             </a:r>
             <a:r>
-              <a:rPr lang="en-US" sz="2000">
+              <a:rPr lang="en-US">
                 <a:latin typeface="Consolas" panose="020B0609020204030204" pitchFamily="49" charset="0"/>
               </a:rPr>
               <a:t> // </a:t>
             </a:r>
             <a:r>
-              <a:rPr lang="en-US" sz="2000" smtClean="0">
+              <a:rPr lang="en-US" smtClean="0">
                 <a:latin typeface="Consolas" panose="020B0609020204030204" pitchFamily="49" charset="0"/>
                 <a:sym typeface="Symbol" panose="05050102010706020507" pitchFamily="18" charset="2"/>
               </a:rPr>
               <a:t> foo&lt;int const&gt;(int const * const &amp;)</a:t>
             </a:r>
-            <a:endParaRPr lang="en-US" sz="2000" smtClean="0">
+            <a:endParaRPr lang="en-US" smtClean="0">
               <a:latin typeface="Consolas" panose="020B0609020204030204" pitchFamily="49" charset="0"/>
             </a:endParaRPr>
           </a:p>
@@ -16381,32 +15972,32 @@
               <a:buNone/>
             </a:pPr>
             <a:r>
-              <a:rPr lang="en-US" sz="2000" smtClean="0">
+              <a:rPr lang="en-US" smtClean="0">
                 <a:latin typeface="Consolas" panose="020B0609020204030204" pitchFamily="49" charset="0"/>
               </a:rPr>
               <a:t>foo (z);</a:t>
             </a:r>
             <a:r>
-              <a:rPr lang="en-US" sz="2000">
+              <a:rPr lang="en-US">
                 <a:latin typeface="Consolas" panose="020B0609020204030204" pitchFamily="49" charset="0"/>
               </a:rPr>
               <a:t> // </a:t>
             </a:r>
             <a:r>
-              <a:rPr lang="en-US" sz="2000" smtClean="0">
+              <a:rPr lang="en-US" smtClean="0">
                 <a:latin typeface="Consolas" panose="020B0609020204030204" pitchFamily="49" charset="0"/>
                 <a:sym typeface="Symbol" panose="05050102010706020507" pitchFamily="18" charset="2"/>
               </a:rPr>
               <a:t> foo&lt;int const&gt;(int const * const &amp;)</a:t>
             </a:r>
             <a:r>
-              <a:rPr lang="en-US" sz="2000">
+              <a:rPr lang="en-US">
                 <a:latin typeface="Consolas" panose="020B0609020204030204" pitchFamily="49" charset="0"/>
               </a:rPr>
               <a:t/>
             </a:r>
             <a:br>
-              <a:rPr lang="en-US" sz="2000">
+              <a:rPr lang="en-US">
                 <a:latin typeface="Consolas" panose="020B0609020204030204" pitchFamily="49" charset="0"/>
               </a:rPr>
             </a:br>
@@ -16492,13 +16083,13 @@
               <a:buNone/>
             </a:pPr>
             <a:r>
-              <a:rPr lang="en-US" sz="2000">
+              <a:rPr lang="en-US">
                 <a:latin typeface="Consolas" panose="020B0609020204030204" pitchFamily="49" charset="0"/>
               </a:rPr>
               <a:t>template &lt;typename T&gt; void foo (</a:t>
             </a:r>
             <a:r>
-              <a:rPr lang="en-US" sz="2000">
+              <a:rPr lang="en-US">
                 <a:solidFill>
                   <a:srgbClr val="0000FF"/>
                 </a:solidFill>
@@ -16507,13 +16098,13 @@
               <a:t>T</a:t>
             </a:r>
             <a:r>
-              <a:rPr lang="en-US" sz="2000">
+              <a:rPr lang="en-US">
                 <a:latin typeface="Consolas" panose="020B0609020204030204" pitchFamily="49" charset="0"/>
               </a:rPr>
               <a:t> t</a:t>
             </a:r>
             <a:r>
-              <a:rPr lang="en-US" sz="2000" smtClean="0">
+              <a:rPr lang="en-US" smtClean="0">
                 <a:latin typeface="Consolas" panose="020B0609020204030204" pitchFamily="49" charset="0"/>
               </a:rPr>
               <a:t>);</a:t>
@@ -16524,7 +16115,7 @@
               <a:buNone/>
             </a:pPr>
             <a:r>
-              <a:rPr lang="en-US" sz="2000" smtClean="0">
+              <a:rPr lang="en-US" smtClean="0">
                 <a:latin typeface="Consolas" panose="020B0609020204030204" pitchFamily="49" charset="0"/>
               </a:rPr>
               <a:t>foo (query_resource(0));</a:t>

</xml_diff>

<commit_message>
Finalizing pre-lecture rvalue ref slides
git-svn-id: https://svn.code.sf.net/p/cpp-lects-rus/code/trunk@227 39143b06-f351-456c-9f92-4cd32fad6823
</commit_message>
<xml_diff>
--- a/slides/sep2017/03-typeinference.pptx
+++ b/slides/sep2017/03-typeinference.pptx
@@ -359,7 +359,7 @@
             <a:fld id="{96DFF08F-DC6B-4601-B491-B0F83F6DD2DA}" type="datetimeFigureOut">
               <a:rPr lang="en-US" dirty="0"/>
               <a:pPr/>
-              <a:t>9/27/2017</a:t>
+              <a:t>10/3/2017</a:t>
             </a:fld>
             <a:endParaRPr lang="en-US" dirty="0"/>
           </a:p>
@@ -576,7 +576,7 @@
           <a:p>
             <a:fld id="{96DFF08F-DC6B-4601-B491-B0F83F6DD2DA}" type="datetimeFigureOut">
               <a:rPr lang="en-US" dirty="0"/>
-              <a:t>9/27/2017</a:t>
+              <a:t>10/3/2017</a:t>
             </a:fld>
             <a:endParaRPr lang="en-US" dirty="0"/>
           </a:p>
@@ -751,7 +751,7 @@
           <a:p>
             <a:fld id="{96DFF08F-DC6B-4601-B491-B0F83F6DD2DA}" type="datetimeFigureOut">
               <a:rPr lang="en-US" dirty="0"/>
-              <a:t>9/27/2017</a:t>
+              <a:t>10/3/2017</a:t>
             </a:fld>
             <a:endParaRPr lang="en-US" dirty="0"/>
           </a:p>
@@ -916,7 +916,7 @@
           <a:p>
             <a:fld id="{96DFF08F-DC6B-4601-B491-B0F83F6DD2DA}" type="datetimeFigureOut">
               <a:rPr lang="en-US" dirty="0"/>
-              <a:t>9/27/2017</a:t>
+              <a:t>10/3/2017</a:t>
             </a:fld>
             <a:endParaRPr lang="en-US" dirty="0"/>
           </a:p>
@@ -1162,7 +1162,7 @@
           <a:p>
             <a:fld id="{96DFF08F-DC6B-4601-B491-B0F83F6DD2DA}" type="datetimeFigureOut">
               <a:rPr lang="en-US" dirty="0"/>
-              <a:t>9/27/2017</a:t>
+              <a:t>10/3/2017</a:t>
             </a:fld>
             <a:endParaRPr lang="en-US" dirty="0"/>
           </a:p>
@@ -1480,7 +1480,7 @@
           <a:p>
             <a:fld id="{96DFF08F-DC6B-4601-B491-B0F83F6DD2DA}" type="datetimeFigureOut">
               <a:rPr lang="en-US" dirty="0"/>
-              <a:t>9/27/2017</a:t>
+              <a:t>10/3/2017</a:t>
             </a:fld>
             <a:endParaRPr lang="en-US" dirty="0"/>
           </a:p>
@@ -1899,7 +1899,7 @@
           <a:p>
             <a:fld id="{96DFF08F-DC6B-4601-B491-B0F83F6DD2DA}" type="datetimeFigureOut">
               <a:rPr lang="en-US" dirty="0"/>
-              <a:t>9/27/2017</a:t>
+              <a:t>10/3/2017</a:t>
             </a:fld>
             <a:endParaRPr lang="en-US" dirty="0"/>
           </a:p>
@@ -2012,7 +2012,7 @@
           <a:p>
             <a:fld id="{96DFF08F-DC6B-4601-B491-B0F83F6DD2DA}" type="datetimeFigureOut">
               <a:rPr lang="en-US" dirty="0"/>
-              <a:t>9/27/2017</a:t>
+              <a:t>10/3/2017</a:t>
             </a:fld>
             <a:endParaRPr lang="en-US" dirty="0"/>
           </a:p>
@@ -2102,7 +2102,7 @@
           <a:p>
             <a:fld id="{96DFF08F-DC6B-4601-B491-B0F83F6DD2DA}" type="datetimeFigureOut">
               <a:rPr lang="en-US" dirty="0"/>
-              <a:t>9/27/2017</a:t>
+              <a:t>10/3/2017</a:t>
             </a:fld>
             <a:endParaRPr lang="en-US" dirty="0"/>
           </a:p>
@@ -2387,7 +2387,7 @@
           <a:p>
             <a:fld id="{96DFF08F-DC6B-4601-B491-B0F83F6DD2DA}" type="datetimeFigureOut">
               <a:rPr lang="en-US" dirty="0"/>
-              <a:t>9/27/2017</a:t>
+              <a:t>10/3/2017</a:t>
             </a:fld>
             <a:endParaRPr lang="en-US" dirty="0"/>
           </a:p>
@@ -2654,7 +2654,7 @@
           <a:p>
             <a:fld id="{96DFF08F-DC6B-4601-B491-B0F83F6DD2DA}" type="datetimeFigureOut">
               <a:rPr lang="en-US" dirty="0"/>
-              <a:t>9/27/2017</a:t>
+              <a:t>10/3/2017</a:t>
             </a:fld>
             <a:endParaRPr lang="en-US" dirty="0"/>
           </a:p>
@@ -2903,7 +2903,7 @@
             <a:fld id="{96DFF08F-DC6B-4601-B491-B0F83F6DD2DA}" type="datetimeFigureOut">
               <a:rPr lang="en-US" dirty="0"/>
               <a:pPr/>
-              <a:t>9/27/2017</a:t>
+              <a:t>10/3/2017</a:t>
             </a:fld>
             <a:endParaRPr lang="en-US" dirty="0"/>
           </a:p>
@@ -5547,7 +5547,6 @@
               <a:rPr lang="ru-RU" smtClean="0"/>
               <a:t>Конструктор класса сам может быть шаблонным</a:t>
             </a:r>
-            <a:endParaRPr lang="ru-RU" smtClean="0"/>
           </a:p>
           <a:p>
             <a:pPr marL="45720" indent="0">
@@ -5715,25 +5714,7 @@
                 </a:solidFill>
                 <a:latin typeface="Consolas" panose="020B0609020204030204" pitchFamily="49" charset="0"/>
               </a:rPr>
-              <a:t>container&lt;double</a:t>
-            </a:r>
-            <a:r>
-              <a:rPr lang="en-US" smtClean="0">
-                <a:solidFill>
-                  <a:srgbClr val="FF0000"/>
-                </a:solidFill>
-                <a:latin typeface="Consolas" panose="020B0609020204030204" pitchFamily="49" charset="0"/>
-              </a:rPr>
-              <a:t>&gt;</a:t>
-            </a:r>
-            <a:r>
-              <a:rPr lang="en-US" smtClean="0">
-                <a:solidFill>
-                  <a:srgbClr val="FF0000"/>
-                </a:solidFill>
-                <a:latin typeface="Consolas" panose="020B0609020204030204" pitchFamily="49" charset="0"/>
-              </a:rPr>
-              <a:t>?</a:t>
+              <a:t>container&lt;double&gt;?</a:t>
             </a:r>
             <a:endParaRPr lang="ru-RU" smtClean="0">
               <a:solidFill>
@@ -5762,13 +5743,7 @@
               <a:rPr lang="en-US">
                 <a:latin typeface="Consolas" panose="020B0609020204030204" pitchFamily="49" charset="0"/>
               </a:rPr>
-              <a:t>template argument </a:t>
-            </a:r>
-            <a:r>
-              <a:rPr lang="en-US">
-                <a:latin typeface="Consolas" panose="020B0609020204030204" pitchFamily="49" charset="0"/>
-              </a:rPr>
-              <a:t>deduction/substitution </a:t>
+              <a:t>template argument deduction/substitution </a:t>
             </a:r>
             <a:r>
               <a:rPr lang="en-US" smtClean="0">
@@ -5797,13 +5772,7 @@
               <a:rPr lang="en-US">
                 <a:latin typeface="Consolas" panose="020B0609020204030204" pitchFamily="49" charset="0"/>
               </a:rPr>
-              <a:t>:   couldn't deduce template parameter ‘</a:t>
-            </a:r>
-            <a:r>
-              <a:rPr lang="en-US">
-                <a:latin typeface="Consolas" panose="020B0609020204030204" pitchFamily="49" charset="0"/>
-              </a:rPr>
-              <a:t>T</a:t>
+              <a:t>:   couldn't deduce template parameter ‘T</a:t>
             </a:r>
             <a:r>
               <a:rPr lang="en-US" smtClean="0">
@@ -5832,13 +5801,7 @@
               <a:rPr lang="en-US">
                 <a:latin typeface="Consolas" panose="020B0609020204030204" pitchFamily="49" charset="0"/>
               </a:rPr>
-              <a:t>auto d = container(v.begin(), </a:t>
-            </a:r>
-            <a:r>
-              <a:rPr lang="en-US">
-                <a:latin typeface="Consolas" panose="020B0609020204030204" pitchFamily="49" charset="0"/>
-              </a:rPr>
-              <a:t>v.end</a:t>
+              <a:t>auto d = container(v.begin(), v.end</a:t>
             </a:r>
             <a:r>
               <a:rPr lang="en-US" smtClean="0">
@@ -13694,70 +13657,52 @@
                 </a:solidFill>
                 <a:latin typeface="Consolas" panose="020B0609020204030204" pitchFamily="49" charset="0"/>
               </a:rPr>
-              <a:t>// </a:t>
-            </a:r>
-            <a:r>
-              <a:rPr lang="en-US" smtClean="0">
+              <a:t>// T()</a:t>
+            </a:r>
+            <a:r>
+              <a:rPr lang="ru-RU" smtClean="0">
                 <a:solidFill>
                   <a:srgbClr val="0000FF"/>
                 </a:solidFill>
                 <a:latin typeface="Consolas" panose="020B0609020204030204" pitchFamily="49" charset="0"/>
               </a:rPr>
-              <a:t>T()</a:t>
-            </a:r>
-            <a:r>
-              <a:rPr lang="ru-RU" smtClean="0">
+              <a:t> и </a:t>
+            </a:r>
+            <a:r>
+              <a:rPr lang="en-US" smtClean="0">
                 <a:solidFill>
                   <a:srgbClr val="0000FF"/>
                 </a:solidFill>
                 <a:latin typeface="Consolas" panose="020B0609020204030204" pitchFamily="49" charset="0"/>
               </a:rPr>
-              <a:t> и </a:t>
-            </a:r>
-            <a:r>
-              <a:rPr lang="en-US" smtClean="0">
+              <a:t>U()</a:t>
+            </a:r>
+            <a:r>
+              <a:rPr lang="ru-RU" smtClean="0">
                 <a:solidFill>
                   <a:srgbClr val="0000FF"/>
                 </a:solidFill>
                 <a:latin typeface="Consolas" panose="020B0609020204030204" pitchFamily="49" charset="0"/>
               </a:rPr>
-              <a:t>U()</a:t>
-            </a:r>
-            <a:r>
-              <a:rPr lang="ru-RU" smtClean="0">
+              <a:t> это так себе идея,</a:t>
+            </a:r>
+            <a:r>
+              <a:rPr lang="en-US" smtClean="0">
                 <a:solidFill>
                   <a:srgbClr val="0000FF"/>
                 </a:solidFill>
                 <a:latin typeface="Consolas" panose="020B0609020204030204" pitchFamily="49" charset="0"/>
               </a:rPr>
-              <a:t> это так себе идея,</a:t>
-            </a:r>
-            <a:r>
-              <a:rPr lang="en-US" smtClean="0">
+              <a:t> </a:t>
+            </a:r>
+            <a:r>
+              <a:rPr lang="ru-RU" smtClean="0">
                 <a:solidFill>
                   <a:srgbClr val="0000FF"/>
                 </a:solidFill>
                 <a:latin typeface="Consolas" panose="020B0609020204030204" pitchFamily="49" charset="0"/>
               </a:rPr>
-              <a:t> </a:t>
-            </a:r>
-            <a:r>
-              <a:rPr lang="ru-RU" smtClean="0">
-                <a:solidFill>
-                  <a:srgbClr val="0000FF"/>
-                </a:solidFill>
-                <a:latin typeface="Consolas" panose="020B0609020204030204" pitchFamily="49" charset="0"/>
-              </a:rPr>
-              <a:t>мы </a:t>
-            </a:r>
-            <a:r>
-              <a:rPr lang="ru-RU" smtClean="0">
-                <a:solidFill>
-                  <a:srgbClr val="0000FF"/>
-                </a:solidFill>
-                <a:latin typeface="Consolas" panose="020B0609020204030204" pitchFamily="49" charset="0"/>
-              </a:rPr>
-              <a:t>можем лучше</a:t>
+              <a:t>мы можем лучше</a:t>
             </a:r>
             <a:endParaRPr lang="en-US">
               <a:solidFill>
@@ -15945,8 +15890,12 @@
           <a:p>
             <a:pPr lvl="0"/>
             <a:r>
+              <a:rPr lang="en-US"/>
+              <a:t>Bjarne Stroustrup, The </a:t>
+            </a:r>
+            <a:r>
               <a:rPr lang="en-US" dirty="0"/>
-              <a:t>The C++ Programming Language (4th </a:t>
+              <a:t>C++ Programming Language (4th </a:t>
             </a:r>
             <a:r>
               <a:rPr lang="en-US"/>

</xml_diff>